<commit_message>
Correção no PPT e no Site
</commit_message>
<xml_diff>
--- a/Documentacao/Slides KPRunnin.pptx
+++ b/Documentacao/Slides KPRunnin.pptx
@@ -5,7 +5,7 @@
     <p:sldMasterId id="2147483665" r:id="rId1"/>
   </p:sldMasterIdLst>
   <p:notesMasterIdLst>
-    <p:notesMasterId r:id="rId29"/>
+    <p:notesMasterId r:id="rId24"/>
   </p:notesMasterIdLst>
   <p:sldIdLst>
     <p:sldId id="256" r:id="rId2"/>
@@ -21,61 +21,56 @@
     <p:sldId id="293" r:id="rId12"/>
     <p:sldId id="292" r:id="rId13"/>
     <p:sldId id="294" r:id="rId14"/>
-    <p:sldId id="297" r:id="rId15"/>
-    <p:sldId id="298" r:id="rId16"/>
-    <p:sldId id="299" r:id="rId17"/>
-    <p:sldId id="300" r:id="rId18"/>
-    <p:sldId id="301" r:id="rId19"/>
-    <p:sldId id="302" r:id="rId20"/>
-    <p:sldId id="303" r:id="rId21"/>
-    <p:sldId id="304" r:id="rId22"/>
-    <p:sldId id="305" r:id="rId23"/>
-    <p:sldId id="306" r:id="rId24"/>
-    <p:sldId id="307" r:id="rId25"/>
-    <p:sldId id="308" r:id="rId26"/>
-    <p:sldId id="309" r:id="rId27"/>
-    <p:sldId id="311" r:id="rId28"/>
+    <p:sldId id="301" r:id="rId15"/>
+    <p:sldId id="302" r:id="rId16"/>
+    <p:sldId id="304" r:id="rId17"/>
+    <p:sldId id="305" r:id="rId18"/>
+    <p:sldId id="306" r:id="rId19"/>
+    <p:sldId id="307" r:id="rId20"/>
+    <p:sldId id="308" r:id="rId21"/>
+    <p:sldId id="309" r:id="rId22"/>
+    <p:sldId id="311" r:id="rId23"/>
   </p:sldIdLst>
   <p:sldSz cx="9144000" cy="5143500" type="screen16x9"/>
   <p:notesSz cx="6858000" cy="9144000"/>
   <p:embeddedFontLst>
     <p:embeddedFont>
       <p:font typeface="Bahnschrift SemiBold SemiConden" panose="020B0502040204020203" pitchFamily="34" charset="0"/>
-      <p:bold r:id="rId30"/>
+      <p:bold r:id="rId25"/>
     </p:embeddedFont>
     <p:embeddedFont>
       <p:font typeface="Gadugi" panose="020B0502040204020203" pitchFamily="34" charset="0"/>
-      <p:regular r:id="rId31"/>
-      <p:bold r:id="rId32"/>
+      <p:regular r:id="rId26"/>
+      <p:bold r:id="rId27"/>
     </p:embeddedFont>
     <p:embeddedFont>
       <p:font typeface="Josefin Sans" panose="020B0604020202020204" charset="0"/>
-      <p:regular r:id="rId33"/>
-      <p:bold r:id="rId34"/>
-      <p:italic r:id="rId35"/>
-      <p:boldItalic r:id="rId36"/>
+      <p:regular r:id="rId28"/>
+      <p:bold r:id="rId29"/>
+      <p:italic r:id="rId30"/>
+      <p:boldItalic r:id="rId31"/>
     </p:embeddedFont>
     <p:embeddedFont>
       <p:font typeface="Lucida Sans Unicode" panose="020B0602030504020204" pitchFamily="34" charset="0"/>
-      <p:regular r:id="rId37"/>
+      <p:regular r:id="rId32"/>
     </p:embeddedFont>
     <p:embeddedFont>
       <p:font typeface="MV Boli" panose="02000500030200090000" pitchFamily="2" charset="0"/>
-      <p:regular r:id="rId38"/>
+      <p:regular r:id="rId33"/>
     </p:embeddedFont>
     <p:embeddedFont>
-      <p:font typeface="Roboto Light" pitchFamily="2" charset="0"/>
-      <p:regular r:id="rId39"/>
-      <p:bold r:id="rId40"/>
-      <p:italic r:id="rId41"/>
-      <p:boldItalic r:id="rId42"/>
+      <p:font typeface="Roboto Light" panose="020B0604020202020204" charset="0"/>
+      <p:regular r:id="rId34"/>
+      <p:bold r:id="rId35"/>
+      <p:italic r:id="rId36"/>
+      <p:boldItalic r:id="rId37"/>
     </p:embeddedFont>
     <p:embeddedFont>
-      <p:font typeface="Roboto Thin" pitchFamily="2" charset="0"/>
-      <p:regular r:id="rId43"/>
-      <p:bold r:id="rId44"/>
-      <p:italic r:id="rId45"/>
-      <p:boldItalic r:id="rId46"/>
+      <p:font typeface="Roboto Thin" panose="020B0604020202020204" charset="0"/>
+      <p:regular r:id="rId38"/>
+      <p:bold r:id="rId39"/>
+      <p:italic r:id="rId40"/>
+      <p:boldItalic r:id="rId41"/>
     </p:embeddedFont>
   </p:embeddedFontLst>
   <p:defaultTextStyle>
@@ -1405,7 +1400,7 @@
     </p:spTree>
     <p:extLst>
       <p:ext uri="{BB962C8B-B14F-4D97-AF65-F5344CB8AC3E}">
-        <p14:creationId xmlns:p14="http://schemas.microsoft.com/office/powerpoint/2010/main" val="632775104"/>
+        <p14:creationId xmlns:p14="http://schemas.microsoft.com/office/powerpoint/2010/main" val="2861911655"/>
       </p:ext>
     </p:extLst>
   </p:cSld>
@@ -1514,7 +1509,7 @@
     </p:spTree>
     <p:extLst>
       <p:ext uri="{BB962C8B-B14F-4D97-AF65-F5344CB8AC3E}">
-        <p14:creationId xmlns:p14="http://schemas.microsoft.com/office/powerpoint/2010/main" val="3467377917"/>
+        <p14:creationId xmlns:p14="http://schemas.microsoft.com/office/powerpoint/2010/main" val="2695080713"/>
       </p:ext>
     </p:extLst>
   </p:cSld>
@@ -1623,7 +1618,7 @@
     </p:spTree>
     <p:extLst>
       <p:ext uri="{BB962C8B-B14F-4D97-AF65-F5344CB8AC3E}">
-        <p14:creationId xmlns:p14="http://schemas.microsoft.com/office/powerpoint/2010/main" val="3001719929"/>
+        <p14:creationId xmlns:p14="http://schemas.microsoft.com/office/powerpoint/2010/main" val="3633043636"/>
       </p:ext>
     </p:extLst>
   </p:cSld>
@@ -1732,7 +1727,7 @@
     </p:spTree>
     <p:extLst>
       <p:ext uri="{BB962C8B-B14F-4D97-AF65-F5344CB8AC3E}">
-        <p14:creationId xmlns:p14="http://schemas.microsoft.com/office/powerpoint/2010/main" val="2812924237"/>
+        <p14:creationId xmlns:p14="http://schemas.microsoft.com/office/powerpoint/2010/main" val="2318555181"/>
       </p:ext>
     </p:extLst>
   </p:cSld>
@@ -1841,7 +1836,7 @@
     </p:spTree>
     <p:extLst>
       <p:ext uri="{BB962C8B-B14F-4D97-AF65-F5344CB8AC3E}">
-        <p14:creationId xmlns:p14="http://schemas.microsoft.com/office/powerpoint/2010/main" val="2861911655"/>
+        <p14:creationId xmlns:p14="http://schemas.microsoft.com/office/powerpoint/2010/main" val="2076382917"/>
       </p:ext>
     </p:extLst>
   </p:cSld>
@@ -1950,7 +1945,7 @@
     </p:spTree>
     <p:extLst>
       <p:ext uri="{BB962C8B-B14F-4D97-AF65-F5344CB8AC3E}">
-        <p14:creationId xmlns:p14="http://schemas.microsoft.com/office/powerpoint/2010/main" val="2695080713"/>
+        <p14:creationId xmlns:p14="http://schemas.microsoft.com/office/powerpoint/2010/main" val="1923266480"/>
       </p:ext>
     </p:extLst>
   </p:cSld>
@@ -2161,14 +2156,14 @@
               </a:spcAft>
               <a:buNone/>
             </a:pPr>
-            <a:endParaRPr/>
+            <a:endParaRPr dirty="0"/>
           </a:p>
         </p:txBody>
       </p:sp>
     </p:spTree>
     <p:extLst>
       <p:ext uri="{BB962C8B-B14F-4D97-AF65-F5344CB8AC3E}">
-        <p14:creationId xmlns:p14="http://schemas.microsoft.com/office/powerpoint/2010/main" val="1613071999"/>
+        <p14:creationId xmlns:p14="http://schemas.microsoft.com/office/powerpoint/2010/main" val="2626329243"/>
       </p:ext>
     </p:extLst>
   </p:cSld>
@@ -2277,7 +2272,7 @@
     </p:spTree>
     <p:extLst>
       <p:ext uri="{BB962C8B-B14F-4D97-AF65-F5344CB8AC3E}">
-        <p14:creationId xmlns:p14="http://schemas.microsoft.com/office/powerpoint/2010/main" val="3633043636"/>
+        <p14:creationId xmlns:p14="http://schemas.microsoft.com/office/powerpoint/2010/main" val="801570447"/>
       </p:ext>
     </p:extLst>
   </p:cSld>
@@ -2288,551 +2283,6 @@
 </file>
 
 <file path=ppt/notesSlides/notesSlide22.xml><?xml version="1.0" encoding="utf-8"?>
-<p:notes xmlns:a="http://schemas.openxmlformats.org/drawingml/2006/main" xmlns:r="http://schemas.openxmlformats.org/officeDocument/2006/relationships" xmlns:p="http://schemas.openxmlformats.org/presentationml/2006/main" showMasterSp="0" showMasterPhAnim="0">
-  <p:cSld>
-    <p:spTree>
-      <p:nvGrpSpPr>
-        <p:cNvPr id="1" name="Shape 319"/>
-        <p:cNvGrpSpPr/>
-        <p:nvPr/>
-      </p:nvGrpSpPr>
-      <p:grpSpPr>
-        <a:xfrm>
-          <a:off x="0" y="0"/>
-          <a:ext cx="0" cy="0"/>
-          <a:chOff x="0" y="0"/>
-          <a:chExt cx="0" cy="0"/>
-        </a:xfrm>
-      </p:grpSpPr>
-      <p:sp>
-        <p:nvSpPr>
-          <p:cNvPr id="320" name="Google Shape;320;p:notes"/>
-          <p:cNvSpPr>
-            <a:spLocks noGrp="1" noRot="1" noChangeAspect="1"/>
-          </p:cNvSpPr>
-          <p:nvPr>
-            <p:ph type="sldImg" idx="2"/>
-          </p:nvPr>
-        </p:nvSpPr>
-        <p:spPr>
-          <a:xfrm>
-            <a:off x="381000" y="685800"/>
-            <a:ext cx="6096000" cy="3429000"/>
-          </a:xfrm>
-          <a:custGeom>
-            <a:avLst/>
-            <a:gdLst/>
-            <a:ahLst/>
-            <a:cxnLst/>
-            <a:rect l="l" t="t" r="r" b="b"/>
-            <a:pathLst>
-              <a:path w="120000" h="120000" extrusionOk="0">
-                <a:moveTo>
-                  <a:pt x="0" y="0"/>
-                </a:moveTo>
-                <a:lnTo>
-                  <a:pt x="120000" y="0"/>
-                </a:lnTo>
-                <a:lnTo>
-                  <a:pt x="120000" y="120000"/>
-                </a:lnTo>
-                <a:lnTo>
-                  <a:pt x="0" y="120000"/>
-                </a:lnTo>
-                <a:close/>
-              </a:path>
-            </a:pathLst>
-          </a:custGeom>
-        </p:spPr>
-      </p:sp>
-      <p:sp>
-        <p:nvSpPr>
-          <p:cNvPr id="321" name="Google Shape;321;p:notes"/>
-          <p:cNvSpPr txBox="1">
-            <a:spLocks noGrp="1"/>
-          </p:cNvSpPr>
-          <p:nvPr>
-            <p:ph type="body" idx="1"/>
-          </p:nvPr>
-        </p:nvSpPr>
-        <p:spPr>
-          <a:xfrm>
-            <a:off x="685800" y="4343400"/>
-            <a:ext cx="5486400" cy="4114800"/>
-          </a:xfrm>
-          <a:prstGeom prst="rect">
-            <a:avLst/>
-          </a:prstGeom>
-        </p:spPr>
-        <p:txBody>
-          <a:bodyPr spcFirstLastPara="1" wrap="square" lIns="91425" tIns="91425" rIns="91425" bIns="91425" anchor="t" anchorCtr="0">
-            <a:noAutofit/>
-          </a:bodyPr>
-          <a:lstStyle/>
-          <a:p>
-            <a:pPr marL="0" lvl="0" indent="0" algn="l" rtl="0">
-              <a:spcBef>
-                <a:spcPts val="0"/>
-              </a:spcBef>
-              <a:spcAft>
-                <a:spcPts val="0"/>
-              </a:spcAft>
-              <a:buNone/>
-            </a:pPr>
-            <a:endParaRPr/>
-          </a:p>
-        </p:txBody>
-      </p:sp>
-    </p:spTree>
-    <p:extLst>
-      <p:ext uri="{BB962C8B-B14F-4D97-AF65-F5344CB8AC3E}">
-        <p14:creationId xmlns:p14="http://schemas.microsoft.com/office/powerpoint/2010/main" val="2318555181"/>
-      </p:ext>
-    </p:extLst>
-  </p:cSld>
-  <p:clrMapOvr>
-    <a:masterClrMapping/>
-  </p:clrMapOvr>
-</p:notes>
-</file>
-
-<file path=ppt/notesSlides/notesSlide23.xml><?xml version="1.0" encoding="utf-8"?>
-<p:notes xmlns:a="http://schemas.openxmlformats.org/drawingml/2006/main" xmlns:r="http://schemas.openxmlformats.org/officeDocument/2006/relationships" xmlns:p="http://schemas.openxmlformats.org/presentationml/2006/main" showMasterSp="0" showMasterPhAnim="0">
-  <p:cSld>
-    <p:spTree>
-      <p:nvGrpSpPr>
-        <p:cNvPr id="1" name="Shape 319"/>
-        <p:cNvGrpSpPr/>
-        <p:nvPr/>
-      </p:nvGrpSpPr>
-      <p:grpSpPr>
-        <a:xfrm>
-          <a:off x="0" y="0"/>
-          <a:ext cx="0" cy="0"/>
-          <a:chOff x="0" y="0"/>
-          <a:chExt cx="0" cy="0"/>
-        </a:xfrm>
-      </p:grpSpPr>
-      <p:sp>
-        <p:nvSpPr>
-          <p:cNvPr id="320" name="Google Shape;320;p:notes"/>
-          <p:cNvSpPr>
-            <a:spLocks noGrp="1" noRot="1" noChangeAspect="1"/>
-          </p:cNvSpPr>
-          <p:nvPr>
-            <p:ph type="sldImg" idx="2"/>
-          </p:nvPr>
-        </p:nvSpPr>
-        <p:spPr>
-          <a:xfrm>
-            <a:off x="381000" y="685800"/>
-            <a:ext cx="6096000" cy="3429000"/>
-          </a:xfrm>
-          <a:custGeom>
-            <a:avLst/>
-            <a:gdLst/>
-            <a:ahLst/>
-            <a:cxnLst/>
-            <a:rect l="l" t="t" r="r" b="b"/>
-            <a:pathLst>
-              <a:path w="120000" h="120000" extrusionOk="0">
-                <a:moveTo>
-                  <a:pt x="0" y="0"/>
-                </a:moveTo>
-                <a:lnTo>
-                  <a:pt x="120000" y="0"/>
-                </a:lnTo>
-                <a:lnTo>
-                  <a:pt x="120000" y="120000"/>
-                </a:lnTo>
-                <a:lnTo>
-                  <a:pt x="0" y="120000"/>
-                </a:lnTo>
-                <a:close/>
-              </a:path>
-            </a:pathLst>
-          </a:custGeom>
-        </p:spPr>
-      </p:sp>
-      <p:sp>
-        <p:nvSpPr>
-          <p:cNvPr id="321" name="Google Shape;321;p:notes"/>
-          <p:cNvSpPr txBox="1">
-            <a:spLocks noGrp="1"/>
-          </p:cNvSpPr>
-          <p:nvPr>
-            <p:ph type="body" idx="1"/>
-          </p:nvPr>
-        </p:nvSpPr>
-        <p:spPr>
-          <a:xfrm>
-            <a:off x="685800" y="4343400"/>
-            <a:ext cx="5486400" cy="4114800"/>
-          </a:xfrm>
-          <a:prstGeom prst="rect">
-            <a:avLst/>
-          </a:prstGeom>
-        </p:spPr>
-        <p:txBody>
-          <a:bodyPr spcFirstLastPara="1" wrap="square" lIns="91425" tIns="91425" rIns="91425" bIns="91425" anchor="t" anchorCtr="0">
-            <a:noAutofit/>
-          </a:bodyPr>
-          <a:lstStyle/>
-          <a:p>
-            <a:pPr marL="0" lvl="0" indent="0" algn="l" rtl="0">
-              <a:spcBef>
-                <a:spcPts val="0"/>
-              </a:spcBef>
-              <a:spcAft>
-                <a:spcPts val="0"/>
-              </a:spcAft>
-              <a:buNone/>
-            </a:pPr>
-            <a:endParaRPr/>
-          </a:p>
-        </p:txBody>
-      </p:sp>
-    </p:spTree>
-    <p:extLst>
-      <p:ext uri="{BB962C8B-B14F-4D97-AF65-F5344CB8AC3E}">
-        <p14:creationId xmlns:p14="http://schemas.microsoft.com/office/powerpoint/2010/main" val="2076382917"/>
-      </p:ext>
-    </p:extLst>
-  </p:cSld>
-  <p:clrMapOvr>
-    <a:masterClrMapping/>
-  </p:clrMapOvr>
-</p:notes>
-</file>
-
-<file path=ppt/notesSlides/notesSlide24.xml><?xml version="1.0" encoding="utf-8"?>
-<p:notes xmlns:a="http://schemas.openxmlformats.org/drawingml/2006/main" xmlns:r="http://schemas.openxmlformats.org/officeDocument/2006/relationships" xmlns:p="http://schemas.openxmlformats.org/presentationml/2006/main" showMasterSp="0" showMasterPhAnim="0">
-  <p:cSld>
-    <p:spTree>
-      <p:nvGrpSpPr>
-        <p:cNvPr id="1" name="Shape 319"/>
-        <p:cNvGrpSpPr/>
-        <p:nvPr/>
-      </p:nvGrpSpPr>
-      <p:grpSpPr>
-        <a:xfrm>
-          <a:off x="0" y="0"/>
-          <a:ext cx="0" cy="0"/>
-          <a:chOff x="0" y="0"/>
-          <a:chExt cx="0" cy="0"/>
-        </a:xfrm>
-      </p:grpSpPr>
-      <p:sp>
-        <p:nvSpPr>
-          <p:cNvPr id="320" name="Google Shape;320;p:notes"/>
-          <p:cNvSpPr>
-            <a:spLocks noGrp="1" noRot="1" noChangeAspect="1"/>
-          </p:cNvSpPr>
-          <p:nvPr>
-            <p:ph type="sldImg" idx="2"/>
-          </p:nvPr>
-        </p:nvSpPr>
-        <p:spPr>
-          <a:xfrm>
-            <a:off x="381000" y="685800"/>
-            <a:ext cx="6096000" cy="3429000"/>
-          </a:xfrm>
-          <a:custGeom>
-            <a:avLst/>
-            <a:gdLst/>
-            <a:ahLst/>
-            <a:cxnLst/>
-            <a:rect l="l" t="t" r="r" b="b"/>
-            <a:pathLst>
-              <a:path w="120000" h="120000" extrusionOk="0">
-                <a:moveTo>
-                  <a:pt x="0" y="0"/>
-                </a:moveTo>
-                <a:lnTo>
-                  <a:pt x="120000" y="0"/>
-                </a:lnTo>
-                <a:lnTo>
-                  <a:pt x="120000" y="120000"/>
-                </a:lnTo>
-                <a:lnTo>
-                  <a:pt x="0" y="120000"/>
-                </a:lnTo>
-                <a:close/>
-              </a:path>
-            </a:pathLst>
-          </a:custGeom>
-        </p:spPr>
-      </p:sp>
-      <p:sp>
-        <p:nvSpPr>
-          <p:cNvPr id="321" name="Google Shape;321;p:notes"/>
-          <p:cNvSpPr txBox="1">
-            <a:spLocks noGrp="1"/>
-          </p:cNvSpPr>
-          <p:nvPr>
-            <p:ph type="body" idx="1"/>
-          </p:nvPr>
-        </p:nvSpPr>
-        <p:spPr>
-          <a:xfrm>
-            <a:off x="685800" y="4343400"/>
-            <a:ext cx="5486400" cy="4114800"/>
-          </a:xfrm>
-          <a:prstGeom prst="rect">
-            <a:avLst/>
-          </a:prstGeom>
-        </p:spPr>
-        <p:txBody>
-          <a:bodyPr spcFirstLastPara="1" wrap="square" lIns="91425" tIns="91425" rIns="91425" bIns="91425" anchor="t" anchorCtr="0">
-            <a:noAutofit/>
-          </a:bodyPr>
-          <a:lstStyle/>
-          <a:p>
-            <a:pPr marL="0" lvl="0" indent="0" algn="l" rtl="0">
-              <a:spcBef>
-                <a:spcPts val="0"/>
-              </a:spcBef>
-              <a:spcAft>
-                <a:spcPts val="0"/>
-              </a:spcAft>
-              <a:buNone/>
-            </a:pPr>
-            <a:endParaRPr/>
-          </a:p>
-        </p:txBody>
-      </p:sp>
-    </p:spTree>
-    <p:extLst>
-      <p:ext uri="{BB962C8B-B14F-4D97-AF65-F5344CB8AC3E}">
-        <p14:creationId xmlns:p14="http://schemas.microsoft.com/office/powerpoint/2010/main" val="1923266480"/>
-      </p:ext>
-    </p:extLst>
-  </p:cSld>
-  <p:clrMapOvr>
-    <a:masterClrMapping/>
-  </p:clrMapOvr>
-</p:notes>
-</file>
-
-<file path=ppt/notesSlides/notesSlide25.xml><?xml version="1.0" encoding="utf-8"?>
-<p:notes xmlns:a="http://schemas.openxmlformats.org/drawingml/2006/main" xmlns:r="http://schemas.openxmlformats.org/officeDocument/2006/relationships" xmlns:p="http://schemas.openxmlformats.org/presentationml/2006/main" showMasterSp="0" showMasterPhAnim="0">
-  <p:cSld>
-    <p:spTree>
-      <p:nvGrpSpPr>
-        <p:cNvPr id="1" name="Shape 319"/>
-        <p:cNvGrpSpPr/>
-        <p:nvPr/>
-      </p:nvGrpSpPr>
-      <p:grpSpPr>
-        <a:xfrm>
-          <a:off x="0" y="0"/>
-          <a:ext cx="0" cy="0"/>
-          <a:chOff x="0" y="0"/>
-          <a:chExt cx="0" cy="0"/>
-        </a:xfrm>
-      </p:grpSpPr>
-      <p:sp>
-        <p:nvSpPr>
-          <p:cNvPr id="320" name="Google Shape;320;p:notes"/>
-          <p:cNvSpPr>
-            <a:spLocks noGrp="1" noRot="1" noChangeAspect="1"/>
-          </p:cNvSpPr>
-          <p:nvPr>
-            <p:ph type="sldImg" idx="2"/>
-          </p:nvPr>
-        </p:nvSpPr>
-        <p:spPr>
-          <a:xfrm>
-            <a:off x="381000" y="685800"/>
-            <a:ext cx="6096000" cy="3429000"/>
-          </a:xfrm>
-          <a:custGeom>
-            <a:avLst/>
-            <a:gdLst/>
-            <a:ahLst/>
-            <a:cxnLst/>
-            <a:rect l="l" t="t" r="r" b="b"/>
-            <a:pathLst>
-              <a:path w="120000" h="120000" extrusionOk="0">
-                <a:moveTo>
-                  <a:pt x="0" y="0"/>
-                </a:moveTo>
-                <a:lnTo>
-                  <a:pt x="120000" y="0"/>
-                </a:lnTo>
-                <a:lnTo>
-                  <a:pt x="120000" y="120000"/>
-                </a:lnTo>
-                <a:lnTo>
-                  <a:pt x="0" y="120000"/>
-                </a:lnTo>
-                <a:close/>
-              </a:path>
-            </a:pathLst>
-          </a:custGeom>
-        </p:spPr>
-      </p:sp>
-      <p:sp>
-        <p:nvSpPr>
-          <p:cNvPr id="321" name="Google Shape;321;p:notes"/>
-          <p:cNvSpPr txBox="1">
-            <a:spLocks noGrp="1"/>
-          </p:cNvSpPr>
-          <p:nvPr>
-            <p:ph type="body" idx="1"/>
-          </p:nvPr>
-        </p:nvSpPr>
-        <p:spPr>
-          <a:xfrm>
-            <a:off x="685800" y="4343400"/>
-            <a:ext cx="5486400" cy="4114800"/>
-          </a:xfrm>
-          <a:prstGeom prst="rect">
-            <a:avLst/>
-          </a:prstGeom>
-        </p:spPr>
-        <p:txBody>
-          <a:bodyPr spcFirstLastPara="1" wrap="square" lIns="91425" tIns="91425" rIns="91425" bIns="91425" anchor="t" anchorCtr="0">
-            <a:noAutofit/>
-          </a:bodyPr>
-          <a:lstStyle/>
-          <a:p>
-            <a:pPr marL="0" lvl="0" indent="0" algn="l" rtl="0">
-              <a:spcBef>
-                <a:spcPts val="0"/>
-              </a:spcBef>
-              <a:spcAft>
-                <a:spcPts val="0"/>
-              </a:spcAft>
-              <a:buNone/>
-            </a:pPr>
-            <a:endParaRPr dirty="0"/>
-          </a:p>
-        </p:txBody>
-      </p:sp>
-    </p:spTree>
-    <p:extLst>
-      <p:ext uri="{BB962C8B-B14F-4D97-AF65-F5344CB8AC3E}">
-        <p14:creationId xmlns:p14="http://schemas.microsoft.com/office/powerpoint/2010/main" val="2626329243"/>
-      </p:ext>
-    </p:extLst>
-  </p:cSld>
-  <p:clrMapOvr>
-    <a:masterClrMapping/>
-  </p:clrMapOvr>
-</p:notes>
-</file>
-
-<file path=ppt/notesSlides/notesSlide26.xml><?xml version="1.0" encoding="utf-8"?>
-<p:notes xmlns:a="http://schemas.openxmlformats.org/drawingml/2006/main" xmlns:r="http://schemas.openxmlformats.org/officeDocument/2006/relationships" xmlns:p="http://schemas.openxmlformats.org/presentationml/2006/main" showMasterSp="0" showMasterPhAnim="0">
-  <p:cSld>
-    <p:spTree>
-      <p:nvGrpSpPr>
-        <p:cNvPr id="1" name="Shape 319"/>
-        <p:cNvGrpSpPr/>
-        <p:nvPr/>
-      </p:nvGrpSpPr>
-      <p:grpSpPr>
-        <a:xfrm>
-          <a:off x="0" y="0"/>
-          <a:ext cx="0" cy="0"/>
-          <a:chOff x="0" y="0"/>
-          <a:chExt cx="0" cy="0"/>
-        </a:xfrm>
-      </p:grpSpPr>
-      <p:sp>
-        <p:nvSpPr>
-          <p:cNvPr id="320" name="Google Shape;320;p:notes"/>
-          <p:cNvSpPr>
-            <a:spLocks noGrp="1" noRot="1" noChangeAspect="1"/>
-          </p:cNvSpPr>
-          <p:nvPr>
-            <p:ph type="sldImg" idx="2"/>
-          </p:nvPr>
-        </p:nvSpPr>
-        <p:spPr>
-          <a:xfrm>
-            <a:off x="381000" y="685800"/>
-            <a:ext cx="6096000" cy="3429000"/>
-          </a:xfrm>
-          <a:custGeom>
-            <a:avLst/>
-            <a:gdLst/>
-            <a:ahLst/>
-            <a:cxnLst/>
-            <a:rect l="l" t="t" r="r" b="b"/>
-            <a:pathLst>
-              <a:path w="120000" h="120000" extrusionOk="0">
-                <a:moveTo>
-                  <a:pt x="0" y="0"/>
-                </a:moveTo>
-                <a:lnTo>
-                  <a:pt x="120000" y="0"/>
-                </a:lnTo>
-                <a:lnTo>
-                  <a:pt x="120000" y="120000"/>
-                </a:lnTo>
-                <a:lnTo>
-                  <a:pt x="0" y="120000"/>
-                </a:lnTo>
-                <a:close/>
-              </a:path>
-            </a:pathLst>
-          </a:custGeom>
-        </p:spPr>
-      </p:sp>
-      <p:sp>
-        <p:nvSpPr>
-          <p:cNvPr id="321" name="Google Shape;321;p:notes"/>
-          <p:cNvSpPr txBox="1">
-            <a:spLocks noGrp="1"/>
-          </p:cNvSpPr>
-          <p:nvPr>
-            <p:ph type="body" idx="1"/>
-          </p:nvPr>
-        </p:nvSpPr>
-        <p:spPr>
-          <a:xfrm>
-            <a:off x="685800" y="4343400"/>
-            <a:ext cx="5486400" cy="4114800"/>
-          </a:xfrm>
-          <a:prstGeom prst="rect">
-            <a:avLst/>
-          </a:prstGeom>
-        </p:spPr>
-        <p:txBody>
-          <a:bodyPr spcFirstLastPara="1" wrap="square" lIns="91425" tIns="91425" rIns="91425" bIns="91425" anchor="t" anchorCtr="0">
-            <a:noAutofit/>
-          </a:bodyPr>
-          <a:lstStyle/>
-          <a:p>
-            <a:pPr marL="0" lvl="0" indent="0" algn="l" rtl="0">
-              <a:spcBef>
-                <a:spcPts val="0"/>
-              </a:spcBef>
-              <a:spcAft>
-                <a:spcPts val="0"/>
-              </a:spcAft>
-              <a:buNone/>
-            </a:pPr>
-            <a:endParaRPr/>
-          </a:p>
-        </p:txBody>
-      </p:sp>
-    </p:spTree>
-    <p:extLst>
-      <p:ext uri="{BB962C8B-B14F-4D97-AF65-F5344CB8AC3E}">
-        <p14:creationId xmlns:p14="http://schemas.microsoft.com/office/powerpoint/2010/main" val="801570447"/>
-      </p:ext>
-    </p:extLst>
-  </p:cSld>
-  <p:clrMapOvr>
-    <a:masterClrMapping/>
-  </p:clrMapOvr>
-</p:notes>
-</file>
-
-<file path=ppt/notesSlides/notesSlide27.xml><?xml version="1.0" encoding="utf-8"?>
 <p:notes xmlns:a="http://schemas.openxmlformats.org/drawingml/2006/main" xmlns:r="http://schemas.openxmlformats.org/officeDocument/2006/relationships" xmlns:p="http://schemas.openxmlformats.org/presentationml/2006/main" showMasterSp="0" showMasterPhAnim="0">
   <p:cSld>
     <p:spTree>
@@ -19976,56 +19426,6 @@
           </a:prstGeom>
         </p:spPr>
       </p:pic>
-      <p:sp>
-        <p:nvSpPr>
-          <p:cNvPr id="7" name="Google Shape;326;p20"/>
-          <p:cNvSpPr txBox="1">
-            <a:spLocks noGrp="1"/>
-          </p:cNvSpPr>
-          <p:nvPr>
-            <p:ph type="subTitle" idx="1"/>
-          </p:nvPr>
-        </p:nvSpPr>
-        <p:spPr>
-          <a:xfrm>
-            <a:off x="720000" y="2837638"/>
-            <a:ext cx="4448400" cy="1044600"/>
-          </a:xfrm>
-          <a:prstGeom prst="rect">
-            <a:avLst/>
-          </a:prstGeom>
-        </p:spPr>
-        <p:txBody>
-          <a:bodyPr spcFirstLastPara="1" wrap="square" lIns="91425" tIns="91425" rIns="91425" bIns="91425" anchor="t" anchorCtr="0">
-            <a:noAutofit/>
-          </a:bodyPr>
-          <a:lstStyle/>
-          <a:p>
-            <a:pPr marL="0" lvl="0" indent="0" algn="l" rtl="0">
-              <a:spcBef>
-                <a:spcPts val="0"/>
-              </a:spcBef>
-              <a:spcAft>
-                <a:spcPts val="0"/>
-              </a:spcAft>
-              <a:buNone/>
-            </a:pPr>
-            <a:r>
-              <a:rPr lang="pt-BR" dirty="0">
-                <a:solidFill>
-                  <a:srgbClr val="92D050"/>
-                </a:solidFill>
-              </a:rPr>
-              <a:t>Atendente de caixa</a:t>
-            </a:r>
-            <a:endParaRPr dirty="0">
-              <a:solidFill>
-                <a:srgbClr val="92D050"/>
-              </a:solidFill>
-            </a:endParaRPr>
-          </a:p>
-        </p:txBody>
-      </p:sp>
     </p:spTree>
     <p:extLst>
       <p:ext uri="{BB962C8B-B14F-4D97-AF65-F5344CB8AC3E}">
@@ -20230,7 +19630,7 @@
         </p:blipFill>
         <p:spPr>
           <a:xfrm>
-            <a:off x="292329" y="1667335"/>
+            <a:off x="111576" y="182052"/>
             <a:ext cx="1418315" cy="1674086"/>
           </a:xfrm>
           <a:prstGeom prst="rect">
@@ -20250,7 +19650,7 @@
         </p:nvSpPr>
         <p:spPr>
           <a:xfrm>
-            <a:off x="1808571" y="525322"/>
+            <a:off x="1641066" y="313174"/>
             <a:ext cx="6693171" cy="1542964"/>
           </a:xfrm>
           <a:prstGeom prst="rect">
@@ -20301,9 +19701,44 @@
           </a:p>
         </p:txBody>
       </p:sp>
+      <p:pic>
+        <p:nvPicPr>
+          <p:cNvPr id="7" name="Imagem 6" descr="Desenho de personagem de desenho animado&#10;&#10;Descrição gerada com alta confiança">
+            <a:extLst>
+              <a:ext uri="{FF2B5EF4-FFF2-40B4-BE49-F238E27FC236}">
+                <a16:creationId xmlns:a16="http://schemas.microsoft.com/office/drawing/2014/main" id="{39483AC1-317A-4E08-98D0-F3C1A2FD1F29}"/>
+              </a:ext>
+            </a:extLst>
+          </p:cNvPr>
+          <p:cNvPicPr>
+            <a:picLocks noChangeAspect="1"/>
+          </p:cNvPicPr>
+          <p:nvPr/>
+        </p:nvPicPr>
+        <p:blipFill rotWithShape="1">
+          <a:blip r:embed="rId4"/>
+          <a:srcRect b="59782"/>
+          <a:stretch/>
+        </p:blipFill>
+        <p:spPr>
+          <a:xfrm>
+            <a:off x="7388201" y="1733256"/>
+            <a:ext cx="1529490" cy="1674084"/>
+          </a:xfrm>
+          <a:prstGeom prst="rect">
+            <a:avLst/>
+          </a:prstGeom>
+        </p:spPr>
+      </p:pic>
       <p:sp>
         <p:nvSpPr>
-          <p:cNvPr id="10" name="Google Shape;361;p23"/>
+          <p:cNvPr id="11" name="Google Shape;361;p23">
+            <a:extLst>
+              <a:ext uri="{FF2B5EF4-FFF2-40B4-BE49-F238E27FC236}">
+                <a16:creationId xmlns:a16="http://schemas.microsoft.com/office/drawing/2014/main" id="{2E0590D5-7D04-4069-B331-9F6341A03415}"/>
+              </a:ext>
+            </a:extLst>
+          </p:cNvPr>
           <p:cNvSpPr txBox="1">
             <a:spLocks/>
           </p:cNvSpPr>
@@ -20311,7 +19746,7 @@
         </p:nvSpPr>
         <p:spPr>
           <a:xfrm>
-            <a:off x="1808571" y="2767779"/>
+            <a:off x="111576" y="1987258"/>
             <a:ext cx="6693171" cy="1542964"/>
           </a:xfrm>
           <a:prstGeom prst="rect">
@@ -20575,38 +20010,376 @@
           </a:lstStyle>
           <a:p>
             <a:r>
-              <a:rPr lang="pt-BR" sz="2000" b="1" dirty="0"/>
-              <a:t>Para</a:t>
+              <a:rPr lang="pt-BR" sz="2000" b="1"/>
+              <a:t>Eu, enquanto</a:t>
             </a:r>
             <a:r>
-              <a:rPr lang="pt-BR" sz="2000" dirty="0"/>
-              <a:t> que minha aplicação não trave, </a:t>
+              <a:rPr lang="pt-BR" sz="2000"/>
+              <a:t> gerente de loja, </a:t>
             </a:r>
             <a:r>
-              <a:rPr lang="pt-BR" sz="2000" b="1" dirty="0"/>
-              <a:t>enquanto </a:t>
+              <a:rPr lang="pt-BR" sz="2000" b="1"/>
+              <a:t>quero</a:t>
             </a:r>
             <a:r>
-              <a:rPr lang="pt-BR" sz="2000" dirty="0"/>
-              <a:t>atendente de caixa, </a:t>
+              <a:rPr lang="pt-BR" sz="2000"/>
+              <a:t> que meus caixas atendam com agilidade e rapidez </a:t>
             </a:r>
             <a:r>
-              <a:rPr lang="pt-BR" sz="2000" b="1" dirty="0"/>
-              <a:t>eu quero </a:t>
+              <a:rPr lang="pt-BR" sz="2000" b="1"/>
+              <a:t>para</a:t>
             </a:r>
             <a:r>
-              <a:rPr lang="pt-BR" sz="2000" dirty="0"/>
-              <a:t>uma aplicação que monitore os níveis de hardware </a:t>
+              <a:rPr lang="pt-BR" sz="2000"/>
+              <a:t> não ter perdas e insatisfação de clientes, </a:t>
             </a:r>
             <a:r>
-              <a:rPr lang="pt-BR" sz="2000" b="1" dirty="0"/>
-              <a:t>para </a:t>
+              <a:rPr lang="pt-BR" sz="2000" b="1"/>
+              <a:t>pois</a:t>
             </a:r>
             <a:r>
-              <a:rPr lang="pt-BR" sz="2000" dirty="0"/>
-              <a:t>que eu tenha uma previsão de quando meu sistema poderá travar.</a:t>
+              <a:rPr lang="pt-BR" sz="2000"/>
+              <a:t> ocasiona perda de fidelidade e déficit da receita.</a:t>
             </a:r>
+          </a:p>
+          <a:p>
             <a:endParaRPr lang="pt-BR" dirty="0"/>
+          </a:p>
+        </p:txBody>
+      </p:sp>
+      <p:pic>
+        <p:nvPicPr>
+          <p:cNvPr id="12" name="Imagem 11" descr="Uma imagem contendo desenho&#10;&#10;Descrição gerada com muito alta confiança">
+            <a:extLst>
+              <a:ext uri="{FF2B5EF4-FFF2-40B4-BE49-F238E27FC236}">
+                <a16:creationId xmlns:a16="http://schemas.microsoft.com/office/drawing/2014/main" id="{A6801215-D7AB-469A-9936-33602BD12FA4}"/>
+              </a:ext>
+            </a:extLst>
+          </p:cNvPr>
+          <p:cNvPicPr>
+            <a:picLocks noChangeAspect="1"/>
+          </p:cNvPicPr>
+          <p:nvPr/>
+        </p:nvPicPr>
+        <p:blipFill rotWithShape="1">
+          <a:blip r:embed="rId5"/>
+          <a:srcRect b="58706"/>
+          <a:stretch/>
+        </p:blipFill>
+        <p:spPr>
+          <a:xfrm>
+            <a:off x="-19577" y="3293896"/>
+            <a:ext cx="1668879" cy="1800072"/>
+          </a:xfrm>
+          <a:prstGeom prst="rect">
+            <a:avLst/>
+          </a:prstGeom>
+        </p:spPr>
+      </p:pic>
+      <p:sp>
+        <p:nvSpPr>
+          <p:cNvPr id="13" name="Google Shape;361;p23">
+            <a:extLst>
+              <a:ext uri="{FF2B5EF4-FFF2-40B4-BE49-F238E27FC236}">
+                <a16:creationId xmlns:a16="http://schemas.microsoft.com/office/drawing/2014/main" id="{5372EB1C-21B4-4B55-971C-557DBA6E2B02}"/>
+              </a:ext>
+            </a:extLst>
+          </p:cNvPr>
+          <p:cNvSpPr txBox="1">
+            <a:spLocks/>
+          </p:cNvSpPr>
+          <p:nvPr/>
+        </p:nvSpPr>
+        <p:spPr>
+          <a:xfrm>
+            <a:off x="2113460" y="3606173"/>
+            <a:ext cx="6693171" cy="1168984"/>
+          </a:xfrm>
+          <a:prstGeom prst="rect">
+            <a:avLst/>
+          </a:prstGeom>
+          <a:noFill/>
+          <a:ln>
+            <a:noFill/>
+          </a:ln>
+        </p:spPr>
+        <p:txBody>
+          <a:bodyPr spcFirstLastPara="1" wrap="square" lIns="91425" tIns="91425" rIns="91425" bIns="91425" anchor="t" anchorCtr="0">
+            <a:noAutofit/>
+          </a:bodyPr>
+          <a:lstStyle>
+            <a:defPPr marR="0" lvl="0" algn="l" rtl="0">
+              <a:lnSpc>
+                <a:spcPct val="100000"/>
+              </a:lnSpc>
+              <a:spcBef>
+                <a:spcPts val="0"/>
+              </a:spcBef>
+              <a:spcAft>
+                <a:spcPts val="0"/>
+              </a:spcAft>
+            </a:defPPr>
+            <a:lvl1pPr marL="457200" marR="0" lvl="0" indent="-342900" algn="l" rtl="0">
+              <a:lnSpc>
+                <a:spcPct val="100000"/>
+              </a:lnSpc>
+              <a:spcBef>
+                <a:spcPts val="0"/>
+              </a:spcBef>
+              <a:spcAft>
+                <a:spcPts val="0"/>
+              </a:spcAft>
+              <a:buClr>
+                <a:srgbClr val="F3F3F3"/>
+              </a:buClr>
+              <a:buSzPts val="3000"/>
+              <a:buFont typeface="Roboto Light"/>
+              <a:buNone/>
+              <a:defRPr sz="3000" b="0" i="0" u="none" strike="noStrike" cap="none">
+                <a:solidFill>
+                  <a:srgbClr val="F3F3F3"/>
+                </a:solidFill>
+                <a:latin typeface="Roboto Thin"/>
+                <a:ea typeface="Roboto Thin"/>
+                <a:cs typeface="Roboto Thin"/>
+                <a:sym typeface="Roboto Thin"/>
+              </a:defRPr>
+            </a:lvl1pPr>
+            <a:lvl2pPr marL="914400" marR="0" lvl="1" indent="-317500" algn="ctr" rtl="0">
+              <a:lnSpc>
+                <a:spcPct val="100000"/>
+              </a:lnSpc>
+              <a:spcBef>
+                <a:spcPts val="0"/>
+              </a:spcBef>
+              <a:spcAft>
+                <a:spcPts val="0"/>
+              </a:spcAft>
+              <a:buClr>
+                <a:srgbClr val="F3F3F3"/>
+              </a:buClr>
+              <a:buSzPts val="2800"/>
+              <a:buFont typeface="Roboto Light"/>
+              <a:buNone/>
+              <a:defRPr sz="2800" b="0" i="0" u="none" strike="noStrike" cap="none">
+                <a:solidFill>
+                  <a:srgbClr val="F3F3F3"/>
+                </a:solidFill>
+                <a:latin typeface="Roboto Light"/>
+                <a:ea typeface="Roboto Light"/>
+                <a:cs typeface="Roboto Light"/>
+                <a:sym typeface="Roboto Light"/>
+              </a:defRPr>
+            </a:lvl2pPr>
+            <a:lvl3pPr marL="1371600" marR="0" lvl="2" indent="-317500" algn="ctr" rtl="0">
+              <a:lnSpc>
+                <a:spcPct val="100000"/>
+              </a:lnSpc>
+              <a:spcBef>
+                <a:spcPts val="0"/>
+              </a:spcBef>
+              <a:spcAft>
+                <a:spcPts val="0"/>
+              </a:spcAft>
+              <a:buClr>
+                <a:srgbClr val="F3F3F3"/>
+              </a:buClr>
+              <a:buSzPts val="2800"/>
+              <a:buFont typeface="Roboto Light"/>
+              <a:buNone/>
+              <a:defRPr sz="2800" b="0" i="0" u="none" strike="noStrike" cap="none">
+                <a:solidFill>
+                  <a:srgbClr val="F3F3F3"/>
+                </a:solidFill>
+                <a:latin typeface="Roboto Light"/>
+                <a:ea typeface="Roboto Light"/>
+                <a:cs typeface="Roboto Light"/>
+                <a:sym typeface="Roboto Light"/>
+              </a:defRPr>
+            </a:lvl3pPr>
+            <a:lvl4pPr marL="1828800" marR="0" lvl="3" indent="-317500" algn="ctr" rtl="0">
+              <a:lnSpc>
+                <a:spcPct val="100000"/>
+              </a:lnSpc>
+              <a:spcBef>
+                <a:spcPts val="0"/>
+              </a:spcBef>
+              <a:spcAft>
+                <a:spcPts val="0"/>
+              </a:spcAft>
+              <a:buClr>
+                <a:srgbClr val="F3F3F3"/>
+              </a:buClr>
+              <a:buSzPts val="2800"/>
+              <a:buFont typeface="Roboto Light"/>
+              <a:buNone/>
+              <a:defRPr sz="2800" b="0" i="0" u="none" strike="noStrike" cap="none">
+                <a:solidFill>
+                  <a:srgbClr val="F3F3F3"/>
+                </a:solidFill>
+                <a:latin typeface="Roboto Light"/>
+                <a:ea typeface="Roboto Light"/>
+                <a:cs typeface="Roboto Light"/>
+                <a:sym typeface="Roboto Light"/>
+              </a:defRPr>
+            </a:lvl4pPr>
+            <a:lvl5pPr marL="2286000" marR="0" lvl="4" indent="-317500" algn="ctr" rtl="0">
+              <a:lnSpc>
+                <a:spcPct val="100000"/>
+              </a:lnSpc>
+              <a:spcBef>
+                <a:spcPts val="0"/>
+              </a:spcBef>
+              <a:spcAft>
+                <a:spcPts val="0"/>
+              </a:spcAft>
+              <a:buClr>
+                <a:srgbClr val="F3F3F3"/>
+              </a:buClr>
+              <a:buSzPts val="2800"/>
+              <a:buFont typeface="Roboto Light"/>
+              <a:buNone/>
+              <a:defRPr sz="2800" b="0" i="0" u="none" strike="noStrike" cap="none">
+                <a:solidFill>
+                  <a:srgbClr val="F3F3F3"/>
+                </a:solidFill>
+                <a:latin typeface="Roboto Light"/>
+                <a:ea typeface="Roboto Light"/>
+                <a:cs typeface="Roboto Light"/>
+                <a:sym typeface="Roboto Light"/>
+              </a:defRPr>
+            </a:lvl5pPr>
+            <a:lvl6pPr marL="2743200" marR="0" lvl="5" indent="-317500" algn="ctr" rtl="0">
+              <a:lnSpc>
+                <a:spcPct val="100000"/>
+              </a:lnSpc>
+              <a:spcBef>
+                <a:spcPts val="0"/>
+              </a:spcBef>
+              <a:spcAft>
+                <a:spcPts val="0"/>
+              </a:spcAft>
+              <a:buClr>
+                <a:srgbClr val="F3F3F3"/>
+              </a:buClr>
+              <a:buSzPts val="2800"/>
+              <a:buFont typeface="Roboto Light"/>
+              <a:buNone/>
+              <a:defRPr sz="2800" b="0" i="0" u="none" strike="noStrike" cap="none">
+                <a:solidFill>
+                  <a:srgbClr val="F3F3F3"/>
+                </a:solidFill>
+                <a:latin typeface="Roboto Light"/>
+                <a:ea typeface="Roboto Light"/>
+                <a:cs typeface="Roboto Light"/>
+                <a:sym typeface="Roboto Light"/>
+              </a:defRPr>
+            </a:lvl6pPr>
+            <a:lvl7pPr marL="3200400" marR="0" lvl="6" indent="-317500" algn="ctr" rtl="0">
+              <a:lnSpc>
+                <a:spcPct val="100000"/>
+              </a:lnSpc>
+              <a:spcBef>
+                <a:spcPts val="0"/>
+              </a:spcBef>
+              <a:spcAft>
+                <a:spcPts val="0"/>
+              </a:spcAft>
+              <a:buClr>
+                <a:srgbClr val="F3F3F3"/>
+              </a:buClr>
+              <a:buSzPts val="2800"/>
+              <a:buFont typeface="Roboto Light"/>
+              <a:buNone/>
+              <a:defRPr sz="2800" b="0" i="0" u="none" strike="noStrike" cap="none">
+                <a:solidFill>
+                  <a:srgbClr val="F3F3F3"/>
+                </a:solidFill>
+                <a:latin typeface="Roboto Light"/>
+                <a:ea typeface="Roboto Light"/>
+                <a:cs typeface="Roboto Light"/>
+                <a:sym typeface="Roboto Light"/>
+              </a:defRPr>
+            </a:lvl7pPr>
+            <a:lvl8pPr marL="3657600" marR="0" lvl="7" indent="-317500" algn="ctr" rtl="0">
+              <a:lnSpc>
+                <a:spcPct val="100000"/>
+              </a:lnSpc>
+              <a:spcBef>
+                <a:spcPts val="0"/>
+              </a:spcBef>
+              <a:spcAft>
+                <a:spcPts val="0"/>
+              </a:spcAft>
+              <a:buClr>
+                <a:srgbClr val="F3F3F3"/>
+              </a:buClr>
+              <a:buSzPts val="2800"/>
+              <a:buFont typeface="Roboto Light"/>
+              <a:buNone/>
+              <a:defRPr sz="2800" b="0" i="0" u="none" strike="noStrike" cap="none">
+                <a:solidFill>
+                  <a:srgbClr val="F3F3F3"/>
+                </a:solidFill>
+                <a:latin typeface="Roboto Light"/>
+                <a:ea typeface="Roboto Light"/>
+                <a:cs typeface="Roboto Light"/>
+                <a:sym typeface="Roboto Light"/>
+              </a:defRPr>
+            </a:lvl8pPr>
+            <a:lvl9pPr marL="4114800" marR="0" lvl="8" indent="-317500" algn="ctr" rtl="0">
+              <a:lnSpc>
+                <a:spcPct val="100000"/>
+              </a:lnSpc>
+              <a:spcBef>
+                <a:spcPts val="0"/>
+              </a:spcBef>
+              <a:spcAft>
+                <a:spcPts val="0"/>
+              </a:spcAft>
+              <a:buClr>
+                <a:srgbClr val="F3F3F3"/>
+              </a:buClr>
+              <a:buSzPts val="2800"/>
+              <a:buFont typeface="Roboto Light"/>
+              <a:buNone/>
+              <a:defRPr sz="2800" b="0" i="0" u="none" strike="noStrike" cap="none">
+                <a:solidFill>
+                  <a:srgbClr val="F3F3F3"/>
+                </a:solidFill>
+                <a:latin typeface="Roboto Light"/>
+                <a:ea typeface="Roboto Light"/>
+                <a:cs typeface="Roboto Light"/>
+                <a:sym typeface="Roboto Light"/>
+              </a:defRPr>
+            </a:lvl9pPr>
+          </a:lstStyle>
+          <a:p>
+            <a:r>
+              <a:rPr lang="pt-BR" sz="2000" b="1"/>
+              <a:t>Eu, enquanto</a:t>
+            </a:r>
+            <a:r>
+              <a:rPr lang="pt-BR" sz="2000"/>
+              <a:t> responsável de suporte da loja, </a:t>
+            </a:r>
+            <a:r>
+              <a:rPr lang="pt-BR" sz="2000" b="1"/>
+              <a:t>quero</a:t>
+            </a:r>
+            <a:r>
+              <a:rPr lang="pt-BR" sz="2000"/>
+              <a:t> uma aplicação que monitore o computador dos atendentes </a:t>
+            </a:r>
+            <a:r>
+              <a:rPr lang="pt-BR" sz="2000" b="1"/>
+              <a:t>para</a:t>
+            </a:r>
+            <a:r>
+              <a:rPr lang="pt-BR" sz="2000"/>
+              <a:t> não precisar realizar contínuas manutenções.</a:t>
+            </a:r>
+            <a:endParaRPr lang="pt-BR" sz="2000" dirty="0"/>
           </a:p>
         </p:txBody>
       </p:sp>
@@ -20828,10 +20601,15 @@
               <a:buNone/>
             </a:pPr>
             <a:r>
-              <a:rPr lang="en" dirty="0"/>
-              <a:t>USER STORIES</a:t>
+              <a:rPr lang="pt-BR" sz="4800" dirty="0">
+                <a:latin typeface="Josefin Sans"/>
+                <a:ea typeface="Josefin Sans"/>
+                <a:cs typeface="Josefin Sans"/>
+                <a:sym typeface="Josefin Sans"/>
+              </a:rPr>
+              <a:t>PROTO-PERSONAS</a:t>
             </a:r>
-            <a:endParaRPr dirty="0">
+            <a:endParaRPr sz="4800" dirty="0">
               <a:latin typeface="Josefin Sans"/>
               <a:ea typeface="Josefin Sans"/>
               <a:cs typeface="Josefin Sans"/>
@@ -20902,1885 +20680,6 @@
           </a:prstGeom>
         </p:spPr>
       </p:pic>
-      <p:sp>
-        <p:nvSpPr>
-          <p:cNvPr id="7" name="Google Shape;326;p20"/>
-          <p:cNvSpPr txBox="1">
-            <a:spLocks noGrp="1"/>
-          </p:cNvSpPr>
-          <p:nvPr>
-            <p:ph type="subTitle" idx="1"/>
-          </p:nvPr>
-        </p:nvSpPr>
-        <p:spPr>
-          <a:xfrm>
-            <a:off x="720000" y="2837638"/>
-            <a:ext cx="4448400" cy="1044600"/>
-          </a:xfrm>
-          <a:prstGeom prst="rect">
-            <a:avLst/>
-          </a:prstGeom>
-        </p:spPr>
-        <p:txBody>
-          <a:bodyPr spcFirstLastPara="1" wrap="square" lIns="91425" tIns="91425" rIns="91425" bIns="91425" anchor="t" anchorCtr="0">
-            <a:noAutofit/>
-          </a:bodyPr>
-          <a:lstStyle/>
-          <a:p>
-            <a:pPr marL="0" lvl="0" indent="0" algn="l" rtl="0">
-              <a:spcBef>
-                <a:spcPts val="0"/>
-              </a:spcBef>
-              <a:spcAft>
-                <a:spcPts val="0"/>
-              </a:spcAft>
-              <a:buNone/>
-            </a:pPr>
-            <a:r>
-              <a:rPr lang="pt-BR" dirty="0">
-                <a:solidFill>
-                  <a:srgbClr val="92D050"/>
-                </a:solidFill>
-              </a:rPr>
-              <a:t>Gerente de Loja</a:t>
-            </a:r>
-          </a:p>
-        </p:txBody>
-      </p:sp>
-    </p:spTree>
-    <p:extLst>
-      <p:ext uri="{BB962C8B-B14F-4D97-AF65-F5344CB8AC3E}">
-        <p14:creationId xmlns:p14="http://schemas.microsoft.com/office/powerpoint/2010/main" val="884114779"/>
-      </p:ext>
-    </p:extLst>
-  </p:cSld>
-  <p:clrMapOvr>
-    <a:masterClrMapping/>
-  </p:clrMapOvr>
-  <mc:AlternateContent xmlns:mc="http://schemas.openxmlformats.org/markup-compatibility/2006" xmlns:p14="http://schemas.microsoft.com/office/powerpoint/2010/main">
-    <mc:Choice Requires="p14">
-      <p:transition spd="med" p14:dur="700">
-        <p:fade/>
-      </p:transition>
-    </mc:Choice>
-    <mc:Fallback xmlns="">
-      <p:transition spd="med">
-        <p:fade/>
-      </p:transition>
-    </mc:Fallback>
-  </mc:AlternateContent>
-</p:sld>
-</file>
-
-<file path=ppt/slides/slide15.xml><?xml version="1.0" encoding="utf-8"?>
-<p:sld xmlns:a="http://schemas.openxmlformats.org/drawingml/2006/main" xmlns:r="http://schemas.openxmlformats.org/officeDocument/2006/relationships" xmlns:p="http://schemas.openxmlformats.org/presentationml/2006/main">
-  <p:cSld>
-    <p:bg>
-      <p:bgPr>
-        <a:solidFill>
-          <a:srgbClr val="1F1F1F"/>
-        </a:solidFill>
-        <a:effectLst/>
-      </p:bgPr>
-    </p:bg>
-    <p:spTree>
-      <p:nvGrpSpPr>
-        <p:cNvPr id="1" name="Shape 322"/>
-        <p:cNvGrpSpPr/>
-        <p:nvPr/>
-      </p:nvGrpSpPr>
-      <p:grpSpPr>
-        <a:xfrm>
-          <a:off x="0" y="0"/>
-          <a:ext cx="0" cy="0"/>
-          <a:chOff x="0" y="0"/>
-          <a:chExt cx="0" cy="0"/>
-        </a:xfrm>
-      </p:grpSpPr>
-      <p:sp>
-        <p:nvSpPr>
-          <p:cNvPr id="323" name="Google Shape;323;p20"/>
-          <p:cNvSpPr/>
-          <p:nvPr/>
-        </p:nvSpPr>
-        <p:spPr>
-          <a:xfrm>
-            <a:off x="8806631" y="0"/>
-            <a:ext cx="307184" cy="182052"/>
-          </a:xfrm>
-          <a:custGeom>
-            <a:avLst/>
-            <a:gdLst/>
-            <a:ahLst/>
-            <a:cxnLst/>
-            <a:rect l="l" t="t" r="r" b="b"/>
-            <a:pathLst>
-              <a:path w="5850" h="3467" extrusionOk="0">
-                <a:moveTo>
-                  <a:pt x="1" y="1"/>
-                </a:moveTo>
-                <a:cubicBezTo>
-                  <a:pt x="2025" y="1032"/>
-                  <a:pt x="3976" y="2191"/>
-                  <a:pt x="5849" y="3466"/>
-                </a:cubicBezTo>
-                <a:lnTo>
-                  <a:pt x="5849" y="1576"/>
-                </a:lnTo>
-                <a:cubicBezTo>
-                  <a:pt x="5012" y="1028"/>
-                  <a:pt x="4158" y="501"/>
-                  <a:pt x="3290" y="1"/>
-                </a:cubicBezTo>
-                <a:close/>
-              </a:path>
-            </a:pathLst>
-          </a:custGeom>
-          <a:solidFill>
-            <a:srgbClr val="454444"/>
-          </a:solidFill>
-          <a:ln>
-            <a:noFill/>
-          </a:ln>
-        </p:spPr>
-        <p:txBody>
-          <a:bodyPr spcFirstLastPara="1" wrap="square" lIns="91425" tIns="91425" rIns="91425" bIns="91425" anchor="ctr" anchorCtr="0">
-            <a:noAutofit/>
-          </a:bodyPr>
-          <a:lstStyle/>
-          <a:p>
-            <a:pPr marL="0" lvl="0" indent="0" algn="l" rtl="0">
-              <a:spcBef>
-                <a:spcPts val="0"/>
-              </a:spcBef>
-              <a:spcAft>
-                <a:spcPts val="0"/>
-              </a:spcAft>
-              <a:buNone/>
-            </a:pPr>
-            <a:endParaRPr/>
-          </a:p>
-        </p:txBody>
-      </p:sp>
-      <p:sp>
-        <p:nvSpPr>
-          <p:cNvPr id="324" name="Google Shape;324;p20"/>
-          <p:cNvSpPr/>
-          <p:nvPr/>
-        </p:nvSpPr>
-        <p:spPr>
-          <a:xfrm>
-            <a:off x="8765779" y="4940764"/>
-            <a:ext cx="348036" cy="202741"/>
-          </a:xfrm>
-          <a:custGeom>
-            <a:avLst/>
-            <a:gdLst/>
-            <a:ahLst/>
-            <a:cxnLst/>
-            <a:rect l="l" t="t" r="r" b="b"/>
-            <a:pathLst>
-              <a:path w="6628" h="3861" extrusionOk="0">
-                <a:moveTo>
-                  <a:pt x="6627" y="0"/>
-                </a:moveTo>
-                <a:cubicBezTo>
-                  <a:pt x="4515" y="1439"/>
-                  <a:pt x="2302" y="2731"/>
-                  <a:pt x="0" y="3860"/>
-                </a:cubicBezTo>
-                <a:lnTo>
-                  <a:pt x="3382" y="3860"/>
-                </a:lnTo>
-                <a:cubicBezTo>
-                  <a:pt x="4489" y="3241"/>
-                  <a:pt x="5569" y="2585"/>
-                  <a:pt x="6627" y="1890"/>
-                </a:cubicBezTo>
-                <a:lnTo>
-                  <a:pt x="6627" y="0"/>
-                </a:lnTo>
-                <a:close/>
-              </a:path>
-            </a:pathLst>
-          </a:custGeom>
-          <a:solidFill>
-            <a:srgbClr val="303030"/>
-          </a:solidFill>
-          <a:ln>
-            <a:noFill/>
-          </a:ln>
-        </p:spPr>
-        <p:txBody>
-          <a:bodyPr spcFirstLastPara="1" wrap="square" lIns="91425" tIns="91425" rIns="91425" bIns="91425" anchor="ctr" anchorCtr="0">
-            <a:noAutofit/>
-          </a:bodyPr>
-          <a:lstStyle/>
-          <a:p>
-            <a:pPr marL="0" lvl="0" indent="0" algn="l" rtl="0">
-              <a:spcBef>
-                <a:spcPts val="0"/>
-              </a:spcBef>
-              <a:spcAft>
-                <a:spcPts val="0"/>
-              </a:spcAft>
-              <a:buNone/>
-            </a:pPr>
-            <a:endParaRPr/>
-          </a:p>
-        </p:txBody>
-      </p:sp>
-      <p:sp>
-        <p:nvSpPr>
-          <p:cNvPr id="9" name="Google Shape;361;p23"/>
-          <p:cNvSpPr txBox="1">
-            <a:spLocks noGrp="1"/>
-          </p:cNvSpPr>
-          <p:nvPr>
-            <p:ph type="subTitle" idx="1"/>
-          </p:nvPr>
-        </p:nvSpPr>
-        <p:spPr>
-          <a:xfrm>
-            <a:off x="1808571" y="525322"/>
-            <a:ext cx="6693171" cy="1542964"/>
-          </a:xfrm>
-          <a:prstGeom prst="rect">
-            <a:avLst/>
-          </a:prstGeom>
-        </p:spPr>
-        <p:txBody>
-          <a:bodyPr spcFirstLastPara="1" wrap="square" lIns="91425" tIns="91425" rIns="91425" bIns="91425" anchor="t" anchorCtr="0">
-            <a:noAutofit/>
-          </a:bodyPr>
-          <a:lstStyle/>
-          <a:p>
-            <a:r>
-              <a:rPr lang="pt-BR" sz="2000" b="1" dirty="0"/>
-              <a:t>Eu, enquanto</a:t>
-            </a:r>
-            <a:r>
-              <a:rPr lang="pt-BR" sz="2000" dirty="0"/>
-              <a:t> gerente de loja, </a:t>
-            </a:r>
-            <a:r>
-              <a:rPr lang="pt-BR" sz="2000" b="1" dirty="0"/>
-              <a:t>quero</a:t>
-            </a:r>
-            <a:r>
-              <a:rPr lang="pt-BR" sz="2000" dirty="0"/>
-              <a:t> que meus caixas atendam com agilidade e rapidez </a:t>
-            </a:r>
-            <a:r>
-              <a:rPr lang="pt-BR" sz="2000" b="1" dirty="0"/>
-              <a:t>para</a:t>
-            </a:r>
-            <a:r>
-              <a:rPr lang="pt-BR" sz="2000" dirty="0"/>
-              <a:t> não ter perdas e insatisfação de clientes, </a:t>
-            </a:r>
-            <a:r>
-              <a:rPr lang="pt-BR" sz="2000" b="1" dirty="0"/>
-              <a:t>pois</a:t>
-            </a:r>
-            <a:r>
-              <a:rPr lang="pt-BR" sz="2000" dirty="0"/>
-              <a:t> ocasiona perda de fidelidade e déficit da receita.</a:t>
-            </a:r>
-          </a:p>
-          <a:p>
-            <a:endParaRPr lang="pt-BR" dirty="0"/>
-          </a:p>
-        </p:txBody>
-      </p:sp>
-      <p:sp>
-        <p:nvSpPr>
-          <p:cNvPr id="10" name="Google Shape;361;p23"/>
-          <p:cNvSpPr txBox="1">
-            <a:spLocks/>
-          </p:cNvSpPr>
-          <p:nvPr/>
-        </p:nvSpPr>
-        <p:spPr>
-          <a:xfrm>
-            <a:off x="1808571" y="2767779"/>
-            <a:ext cx="6878229" cy="1934850"/>
-          </a:xfrm>
-          <a:prstGeom prst="rect">
-            <a:avLst/>
-          </a:prstGeom>
-          <a:noFill/>
-          <a:ln>
-            <a:noFill/>
-          </a:ln>
-        </p:spPr>
-        <p:txBody>
-          <a:bodyPr spcFirstLastPara="1" wrap="square" lIns="91425" tIns="91425" rIns="91425" bIns="91425" anchor="t" anchorCtr="0">
-            <a:noAutofit/>
-          </a:bodyPr>
-          <a:lstStyle>
-            <a:defPPr marR="0" lvl="0" algn="l" rtl="0">
-              <a:lnSpc>
-                <a:spcPct val="100000"/>
-              </a:lnSpc>
-              <a:spcBef>
-                <a:spcPts val="0"/>
-              </a:spcBef>
-              <a:spcAft>
-                <a:spcPts val="0"/>
-              </a:spcAft>
-            </a:defPPr>
-            <a:lvl1pPr marL="457200" marR="0" lvl="0" indent="-342900" algn="l" rtl="0">
-              <a:lnSpc>
-                <a:spcPct val="100000"/>
-              </a:lnSpc>
-              <a:spcBef>
-                <a:spcPts val="0"/>
-              </a:spcBef>
-              <a:spcAft>
-                <a:spcPts val="0"/>
-              </a:spcAft>
-              <a:buClr>
-                <a:srgbClr val="F3F3F3"/>
-              </a:buClr>
-              <a:buSzPts val="3000"/>
-              <a:buFont typeface="Roboto Light"/>
-              <a:buNone/>
-              <a:defRPr sz="3000" b="0" i="0" u="none" strike="noStrike" cap="none">
-                <a:solidFill>
-                  <a:srgbClr val="F3F3F3"/>
-                </a:solidFill>
-                <a:latin typeface="Roboto Thin"/>
-                <a:ea typeface="Roboto Thin"/>
-                <a:cs typeface="Roboto Thin"/>
-                <a:sym typeface="Roboto Thin"/>
-              </a:defRPr>
-            </a:lvl1pPr>
-            <a:lvl2pPr marL="914400" marR="0" lvl="1" indent="-317500" algn="ctr" rtl="0">
-              <a:lnSpc>
-                <a:spcPct val="100000"/>
-              </a:lnSpc>
-              <a:spcBef>
-                <a:spcPts val="0"/>
-              </a:spcBef>
-              <a:spcAft>
-                <a:spcPts val="0"/>
-              </a:spcAft>
-              <a:buClr>
-                <a:srgbClr val="F3F3F3"/>
-              </a:buClr>
-              <a:buSzPts val="2800"/>
-              <a:buFont typeface="Roboto Light"/>
-              <a:buNone/>
-              <a:defRPr sz="2800" b="0" i="0" u="none" strike="noStrike" cap="none">
-                <a:solidFill>
-                  <a:srgbClr val="F3F3F3"/>
-                </a:solidFill>
-                <a:latin typeface="Roboto Light"/>
-                <a:ea typeface="Roboto Light"/>
-                <a:cs typeface="Roboto Light"/>
-                <a:sym typeface="Roboto Light"/>
-              </a:defRPr>
-            </a:lvl2pPr>
-            <a:lvl3pPr marL="1371600" marR="0" lvl="2" indent="-317500" algn="ctr" rtl="0">
-              <a:lnSpc>
-                <a:spcPct val="100000"/>
-              </a:lnSpc>
-              <a:spcBef>
-                <a:spcPts val="0"/>
-              </a:spcBef>
-              <a:spcAft>
-                <a:spcPts val="0"/>
-              </a:spcAft>
-              <a:buClr>
-                <a:srgbClr val="F3F3F3"/>
-              </a:buClr>
-              <a:buSzPts val="2800"/>
-              <a:buFont typeface="Roboto Light"/>
-              <a:buNone/>
-              <a:defRPr sz="2800" b="0" i="0" u="none" strike="noStrike" cap="none">
-                <a:solidFill>
-                  <a:srgbClr val="F3F3F3"/>
-                </a:solidFill>
-                <a:latin typeface="Roboto Light"/>
-                <a:ea typeface="Roboto Light"/>
-                <a:cs typeface="Roboto Light"/>
-                <a:sym typeface="Roboto Light"/>
-              </a:defRPr>
-            </a:lvl3pPr>
-            <a:lvl4pPr marL="1828800" marR="0" lvl="3" indent="-317500" algn="ctr" rtl="0">
-              <a:lnSpc>
-                <a:spcPct val="100000"/>
-              </a:lnSpc>
-              <a:spcBef>
-                <a:spcPts val="0"/>
-              </a:spcBef>
-              <a:spcAft>
-                <a:spcPts val="0"/>
-              </a:spcAft>
-              <a:buClr>
-                <a:srgbClr val="F3F3F3"/>
-              </a:buClr>
-              <a:buSzPts val="2800"/>
-              <a:buFont typeface="Roboto Light"/>
-              <a:buNone/>
-              <a:defRPr sz="2800" b="0" i="0" u="none" strike="noStrike" cap="none">
-                <a:solidFill>
-                  <a:srgbClr val="F3F3F3"/>
-                </a:solidFill>
-                <a:latin typeface="Roboto Light"/>
-                <a:ea typeface="Roboto Light"/>
-                <a:cs typeface="Roboto Light"/>
-                <a:sym typeface="Roboto Light"/>
-              </a:defRPr>
-            </a:lvl4pPr>
-            <a:lvl5pPr marL="2286000" marR="0" lvl="4" indent="-317500" algn="ctr" rtl="0">
-              <a:lnSpc>
-                <a:spcPct val="100000"/>
-              </a:lnSpc>
-              <a:spcBef>
-                <a:spcPts val="0"/>
-              </a:spcBef>
-              <a:spcAft>
-                <a:spcPts val="0"/>
-              </a:spcAft>
-              <a:buClr>
-                <a:srgbClr val="F3F3F3"/>
-              </a:buClr>
-              <a:buSzPts val="2800"/>
-              <a:buFont typeface="Roboto Light"/>
-              <a:buNone/>
-              <a:defRPr sz="2800" b="0" i="0" u="none" strike="noStrike" cap="none">
-                <a:solidFill>
-                  <a:srgbClr val="F3F3F3"/>
-                </a:solidFill>
-                <a:latin typeface="Roboto Light"/>
-                <a:ea typeface="Roboto Light"/>
-                <a:cs typeface="Roboto Light"/>
-                <a:sym typeface="Roboto Light"/>
-              </a:defRPr>
-            </a:lvl5pPr>
-            <a:lvl6pPr marL="2743200" marR="0" lvl="5" indent="-317500" algn="ctr" rtl="0">
-              <a:lnSpc>
-                <a:spcPct val="100000"/>
-              </a:lnSpc>
-              <a:spcBef>
-                <a:spcPts val="0"/>
-              </a:spcBef>
-              <a:spcAft>
-                <a:spcPts val="0"/>
-              </a:spcAft>
-              <a:buClr>
-                <a:srgbClr val="F3F3F3"/>
-              </a:buClr>
-              <a:buSzPts val="2800"/>
-              <a:buFont typeface="Roboto Light"/>
-              <a:buNone/>
-              <a:defRPr sz="2800" b="0" i="0" u="none" strike="noStrike" cap="none">
-                <a:solidFill>
-                  <a:srgbClr val="F3F3F3"/>
-                </a:solidFill>
-                <a:latin typeface="Roboto Light"/>
-                <a:ea typeface="Roboto Light"/>
-                <a:cs typeface="Roboto Light"/>
-                <a:sym typeface="Roboto Light"/>
-              </a:defRPr>
-            </a:lvl6pPr>
-            <a:lvl7pPr marL="3200400" marR="0" lvl="6" indent="-317500" algn="ctr" rtl="0">
-              <a:lnSpc>
-                <a:spcPct val="100000"/>
-              </a:lnSpc>
-              <a:spcBef>
-                <a:spcPts val="0"/>
-              </a:spcBef>
-              <a:spcAft>
-                <a:spcPts val="0"/>
-              </a:spcAft>
-              <a:buClr>
-                <a:srgbClr val="F3F3F3"/>
-              </a:buClr>
-              <a:buSzPts val="2800"/>
-              <a:buFont typeface="Roboto Light"/>
-              <a:buNone/>
-              <a:defRPr sz="2800" b="0" i="0" u="none" strike="noStrike" cap="none">
-                <a:solidFill>
-                  <a:srgbClr val="F3F3F3"/>
-                </a:solidFill>
-                <a:latin typeface="Roboto Light"/>
-                <a:ea typeface="Roboto Light"/>
-                <a:cs typeface="Roboto Light"/>
-                <a:sym typeface="Roboto Light"/>
-              </a:defRPr>
-            </a:lvl7pPr>
-            <a:lvl8pPr marL="3657600" marR="0" lvl="7" indent="-317500" algn="ctr" rtl="0">
-              <a:lnSpc>
-                <a:spcPct val="100000"/>
-              </a:lnSpc>
-              <a:spcBef>
-                <a:spcPts val="0"/>
-              </a:spcBef>
-              <a:spcAft>
-                <a:spcPts val="0"/>
-              </a:spcAft>
-              <a:buClr>
-                <a:srgbClr val="F3F3F3"/>
-              </a:buClr>
-              <a:buSzPts val="2800"/>
-              <a:buFont typeface="Roboto Light"/>
-              <a:buNone/>
-              <a:defRPr sz="2800" b="0" i="0" u="none" strike="noStrike" cap="none">
-                <a:solidFill>
-                  <a:srgbClr val="F3F3F3"/>
-                </a:solidFill>
-                <a:latin typeface="Roboto Light"/>
-                <a:ea typeface="Roboto Light"/>
-                <a:cs typeface="Roboto Light"/>
-                <a:sym typeface="Roboto Light"/>
-              </a:defRPr>
-            </a:lvl8pPr>
-            <a:lvl9pPr marL="4114800" marR="0" lvl="8" indent="-317500" algn="ctr" rtl="0">
-              <a:lnSpc>
-                <a:spcPct val="100000"/>
-              </a:lnSpc>
-              <a:spcBef>
-                <a:spcPts val="0"/>
-              </a:spcBef>
-              <a:spcAft>
-                <a:spcPts val="0"/>
-              </a:spcAft>
-              <a:buClr>
-                <a:srgbClr val="F3F3F3"/>
-              </a:buClr>
-              <a:buSzPts val="2800"/>
-              <a:buFont typeface="Roboto Light"/>
-              <a:buNone/>
-              <a:defRPr sz="2800" b="0" i="0" u="none" strike="noStrike" cap="none">
-                <a:solidFill>
-                  <a:srgbClr val="F3F3F3"/>
-                </a:solidFill>
-                <a:latin typeface="Roboto Light"/>
-                <a:ea typeface="Roboto Light"/>
-                <a:cs typeface="Roboto Light"/>
-                <a:sym typeface="Roboto Light"/>
-              </a:defRPr>
-            </a:lvl9pPr>
-          </a:lstStyle>
-          <a:p>
-            <a:r>
-              <a:rPr lang="pt-BR" sz="2000" b="1" dirty="0"/>
-              <a:t>Para</a:t>
-            </a:r>
-            <a:r>
-              <a:rPr lang="pt-BR" sz="2000" dirty="0"/>
-              <a:t> que meus caixas atendam com agilidade e rapidez, </a:t>
-            </a:r>
-            <a:r>
-              <a:rPr lang="pt-BR" sz="2000" b="1" dirty="0"/>
-              <a:t>enquanto</a:t>
-            </a:r>
-            <a:r>
-              <a:rPr lang="pt-BR" sz="2000" dirty="0"/>
-              <a:t> gerente de loja, </a:t>
-            </a:r>
-            <a:r>
-              <a:rPr lang="pt-BR" sz="2000" b="1" dirty="0"/>
-              <a:t>eu quero</a:t>
-            </a:r>
-            <a:r>
-              <a:rPr lang="pt-BR" sz="2000" dirty="0"/>
-              <a:t> uma aplicação que me auxilie a monitorar a aplicação de compras dos meus atendentes, </a:t>
-            </a:r>
-            <a:r>
-              <a:rPr lang="pt-BR" sz="2000" b="1" dirty="0"/>
-              <a:t>para</a:t>
-            </a:r>
-            <a:r>
-              <a:rPr lang="pt-BR" sz="2000" dirty="0"/>
-              <a:t> que eu consiga evitar que os sistemas travem e o atendimento flua sem congelamento.</a:t>
-            </a:r>
-          </a:p>
-        </p:txBody>
-      </p:sp>
-      <p:pic>
-        <p:nvPicPr>
-          <p:cNvPr id="7" name="Imagem 6" descr="Desenho de personagem de desenho animado&#10;&#10;Descrição gerada com alta confiança">
-            <a:extLst>
-              <a:ext uri="{FF2B5EF4-FFF2-40B4-BE49-F238E27FC236}">
-                <a16:creationId xmlns:a16="http://schemas.microsoft.com/office/drawing/2014/main" id="{4C2595DE-28D5-469C-8232-894ADFEF7C39}"/>
-              </a:ext>
-            </a:extLst>
-          </p:cNvPr>
-          <p:cNvPicPr>
-            <a:picLocks noChangeAspect="1"/>
-          </p:cNvPicPr>
-          <p:nvPr/>
-        </p:nvPicPr>
-        <p:blipFill rotWithShape="1">
-          <a:blip r:embed="rId3"/>
-          <a:srcRect b="59782"/>
-          <a:stretch/>
-        </p:blipFill>
-        <p:spPr>
-          <a:xfrm>
-            <a:off x="242166" y="1667336"/>
-            <a:ext cx="1529490" cy="1674084"/>
-          </a:xfrm>
-          <a:prstGeom prst="rect">
-            <a:avLst/>
-          </a:prstGeom>
-        </p:spPr>
-      </p:pic>
-    </p:spTree>
-    <p:extLst>
-      <p:ext uri="{BB962C8B-B14F-4D97-AF65-F5344CB8AC3E}">
-        <p14:creationId xmlns:p14="http://schemas.microsoft.com/office/powerpoint/2010/main" val="1298734824"/>
-      </p:ext>
-    </p:extLst>
-  </p:cSld>
-  <p:clrMapOvr>
-    <a:masterClrMapping/>
-  </p:clrMapOvr>
-  <mc:AlternateContent xmlns:mc="http://schemas.openxmlformats.org/markup-compatibility/2006" xmlns:p14="http://schemas.microsoft.com/office/powerpoint/2010/main">
-    <mc:Choice Requires="p14">
-      <p:transition spd="med" p14:dur="700">
-        <p:fade/>
-      </p:transition>
-    </mc:Choice>
-    <mc:Fallback xmlns="">
-      <p:transition spd="med">
-        <p:fade/>
-      </p:transition>
-    </mc:Fallback>
-  </mc:AlternateContent>
-</p:sld>
-</file>
-
-<file path=ppt/slides/slide16.xml><?xml version="1.0" encoding="utf-8"?>
-<p:sld xmlns:a="http://schemas.openxmlformats.org/drawingml/2006/main" xmlns:r="http://schemas.openxmlformats.org/officeDocument/2006/relationships" xmlns:p="http://schemas.openxmlformats.org/presentationml/2006/main">
-  <p:cSld>
-    <p:bg>
-      <p:bgPr>
-        <a:solidFill>
-          <a:srgbClr val="1F1F1F"/>
-        </a:solidFill>
-        <a:effectLst/>
-      </p:bgPr>
-    </p:bg>
-    <p:spTree>
-      <p:nvGrpSpPr>
-        <p:cNvPr id="1" name="Shape 322"/>
-        <p:cNvGrpSpPr/>
-        <p:nvPr/>
-      </p:nvGrpSpPr>
-      <p:grpSpPr>
-        <a:xfrm>
-          <a:off x="0" y="0"/>
-          <a:ext cx="0" cy="0"/>
-          <a:chOff x="0" y="0"/>
-          <a:chExt cx="0" cy="0"/>
-        </a:xfrm>
-      </p:grpSpPr>
-      <p:sp>
-        <p:nvSpPr>
-          <p:cNvPr id="323" name="Google Shape;323;p20"/>
-          <p:cNvSpPr/>
-          <p:nvPr/>
-        </p:nvSpPr>
-        <p:spPr>
-          <a:xfrm>
-            <a:off x="8806631" y="0"/>
-            <a:ext cx="307184" cy="182052"/>
-          </a:xfrm>
-          <a:custGeom>
-            <a:avLst/>
-            <a:gdLst/>
-            <a:ahLst/>
-            <a:cxnLst/>
-            <a:rect l="l" t="t" r="r" b="b"/>
-            <a:pathLst>
-              <a:path w="5850" h="3467" extrusionOk="0">
-                <a:moveTo>
-                  <a:pt x="1" y="1"/>
-                </a:moveTo>
-                <a:cubicBezTo>
-                  <a:pt x="2025" y="1032"/>
-                  <a:pt x="3976" y="2191"/>
-                  <a:pt x="5849" y="3466"/>
-                </a:cubicBezTo>
-                <a:lnTo>
-                  <a:pt x="5849" y="1576"/>
-                </a:lnTo>
-                <a:cubicBezTo>
-                  <a:pt x="5012" y="1028"/>
-                  <a:pt x="4158" y="501"/>
-                  <a:pt x="3290" y="1"/>
-                </a:cubicBezTo>
-                <a:close/>
-              </a:path>
-            </a:pathLst>
-          </a:custGeom>
-          <a:solidFill>
-            <a:srgbClr val="454444"/>
-          </a:solidFill>
-          <a:ln>
-            <a:noFill/>
-          </a:ln>
-        </p:spPr>
-        <p:txBody>
-          <a:bodyPr spcFirstLastPara="1" wrap="square" lIns="91425" tIns="91425" rIns="91425" bIns="91425" anchor="ctr" anchorCtr="0">
-            <a:noAutofit/>
-          </a:bodyPr>
-          <a:lstStyle/>
-          <a:p>
-            <a:pPr marL="0" lvl="0" indent="0" algn="l" rtl="0">
-              <a:spcBef>
-                <a:spcPts val="0"/>
-              </a:spcBef>
-              <a:spcAft>
-                <a:spcPts val="0"/>
-              </a:spcAft>
-              <a:buNone/>
-            </a:pPr>
-            <a:endParaRPr/>
-          </a:p>
-        </p:txBody>
-      </p:sp>
-      <p:sp>
-        <p:nvSpPr>
-          <p:cNvPr id="324" name="Google Shape;324;p20"/>
-          <p:cNvSpPr/>
-          <p:nvPr/>
-        </p:nvSpPr>
-        <p:spPr>
-          <a:xfrm>
-            <a:off x="8765779" y="4940764"/>
-            <a:ext cx="348036" cy="202741"/>
-          </a:xfrm>
-          <a:custGeom>
-            <a:avLst/>
-            <a:gdLst/>
-            <a:ahLst/>
-            <a:cxnLst/>
-            <a:rect l="l" t="t" r="r" b="b"/>
-            <a:pathLst>
-              <a:path w="6628" h="3861" extrusionOk="0">
-                <a:moveTo>
-                  <a:pt x="6627" y="0"/>
-                </a:moveTo>
-                <a:cubicBezTo>
-                  <a:pt x="4515" y="1439"/>
-                  <a:pt x="2302" y="2731"/>
-                  <a:pt x="0" y="3860"/>
-                </a:cubicBezTo>
-                <a:lnTo>
-                  <a:pt x="3382" y="3860"/>
-                </a:lnTo>
-                <a:cubicBezTo>
-                  <a:pt x="4489" y="3241"/>
-                  <a:pt x="5569" y="2585"/>
-                  <a:pt x="6627" y="1890"/>
-                </a:cubicBezTo>
-                <a:lnTo>
-                  <a:pt x="6627" y="0"/>
-                </a:lnTo>
-                <a:close/>
-              </a:path>
-            </a:pathLst>
-          </a:custGeom>
-          <a:solidFill>
-            <a:srgbClr val="303030"/>
-          </a:solidFill>
-          <a:ln>
-            <a:noFill/>
-          </a:ln>
-        </p:spPr>
-        <p:txBody>
-          <a:bodyPr spcFirstLastPara="1" wrap="square" lIns="91425" tIns="91425" rIns="91425" bIns="91425" anchor="ctr" anchorCtr="0">
-            <a:noAutofit/>
-          </a:bodyPr>
-          <a:lstStyle/>
-          <a:p>
-            <a:pPr marL="0" lvl="0" indent="0" algn="l" rtl="0">
-              <a:spcBef>
-                <a:spcPts val="0"/>
-              </a:spcBef>
-              <a:spcAft>
-                <a:spcPts val="0"/>
-              </a:spcAft>
-              <a:buNone/>
-            </a:pPr>
-            <a:endParaRPr/>
-          </a:p>
-        </p:txBody>
-      </p:sp>
-      <p:sp>
-        <p:nvSpPr>
-          <p:cNvPr id="325" name="Google Shape;325;p20"/>
-          <p:cNvSpPr txBox="1">
-            <a:spLocks noGrp="1"/>
-          </p:cNvSpPr>
-          <p:nvPr>
-            <p:ph type="ctrTitle"/>
-          </p:nvPr>
-        </p:nvSpPr>
-        <p:spPr>
-          <a:xfrm>
-            <a:off x="720000" y="804075"/>
-            <a:ext cx="7704000" cy="1989000"/>
-          </a:xfrm>
-          <a:prstGeom prst="rect">
-            <a:avLst/>
-          </a:prstGeom>
-        </p:spPr>
-        <p:txBody>
-          <a:bodyPr spcFirstLastPara="1" wrap="square" lIns="91425" tIns="91425" rIns="91425" bIns="91425" anchor="b" anchorCtr="0">
-            <a:noAutofit/>
-          </a:bodyPr>
-          <a:lstStyle/>
-          <a:p>
-            <a:pPr marL="0" lvl="0" indent="0" algn="l" rtl="0">
-              <a:spcBef>
-                <a:spcPts val="0"/>
-              </a:spcBef>
-              <a:spcAft>
-                <a:spcPts val="0"/>
-              </a:spcAft>
-              <a:buNone/>
-            </a:pPr>
-            <a:r>
-              <a:rPr lang="en" dirty="0"/>
-              <a:t>USER STORIES</a:t>
-            </a:r>
-            <a:endParaRPr dirty="0">
-              <a:latin typeface="Josefin Sans"/>
-              <a:ea typeface="Josefin Sans"/>
-              <a:cs typeface="Josefin Sans"/>
-              <a:sym typeface="Josefin Sans"/>
-            </a:endParaRPr>
-          </a:p>
-        </p:txBody>
-      </p:sp>
-      <p:cxnSp>
-        <p:nvCxnSpPr>
-          <p:cNvPr id="327" name="Google Shape;327;p20"/>
-          <p:cNvCxnSpPr/>
-          <p:nvPr/>
-        </p:nvCxnSpPr>
-        <p:spPr>
-          <a:xfrm>
-            <a:off x="841434" y="2762125"/>
-            <a:ext cx="373800" cy="0"/>
-          </a:xfrm>
-          <a:prstGeom prst="straightConnector1">
-            <a:avLst/>
-          </a:prstGeom>
-          <a:noFill/>
-          <a:ln w="19050" cap="flat" cmpd="sng">
-            <a:solidFill>
-              <a:srgbClr val="F3F3F3"/>
-            </a:solidFill>
-            <a:prstDash val="solid"/>
-            <a:round/>
-            <a:headEnd type="none" w="med" len="med"/>
-            <a:tailEnd type="none" w="med" len="med"/>
-          </a:ln>
-        </p:spPr>
-      </p:cxnSp>
-      <p:pic>
-        <p:nvPicPr>
-          <p:cNvPr id="14" name="Imagem 13">
-            <a:extLst>
-              <a:ext uri="{FF2B5EF4-FFF2-40B4-BE49-F238E27FC236}">
-                <a16:creationId xmlns:a16="http://schemas.microsoft.com/office/drawing/2014/main" id="{A1546BA2-A746-4D78-BA2A-66EACE53308E}"/>
-              </a:ext>
-            </a:extLst>
-          </p:cNvPr>
-          <p:cNvPicPr>
-            <a:picLocks noChangeAspect="1"/>
-          </p:cNvPicPr>
-          <p:nvPr/>
-        </p:nvPicPr>
-        <p:blipFill>
-          <a:blip r:embed="rId3">
-            <a:extLst>
-              <a:ext uri="{28A0092B-C50C-407E-A947-70E740481C1C}">
-                <a14:useLocalDpi xmlns:a14="http://schemas.microsoft.com/office/drawing/2010/main" val="0"/>
-              </a:ext>
-            </a:extLst>
-          </a:blip>
-          <a:stretch>
-            <a:fillRect/>
-          </a:stretch>
-        </p:blipFill>
-        <p:spPr>
-          <a:xfrm>
-            <a:off x="6411514" y="1407885"/>
-            <a:ext cx="2133920" cy="2133920"/>
-          </a:xfrm>
-          <a:prstGeom prst="rect">
-            <a:avLst/>
-          </a:prstGeom>
-        </p:spPr>
-      </p:pic>
-      <p:sp>
-        <p:nvSpPr>
-          <p:cNvPr id="7" name="Google Shape;326;p20"/>
-          <p:cNvSpPr txBox="1">
-            <a:spLocks noGrp="1"/>
-          </p:cNvSpPr>
-          <p:nvPr>
-            <p:ph type="subTitle" idx="1"/>
-          </p:nvPr>
-        </p:nvSpPr>
-        <p:spPr>
-          <a:xfrm>
-            <a:off x="720000" y="2837638"/>
-            <a:ext cx="4448400" cy="1044600"/>
-          </a:xfrm>
-          <a:prstGeom prst="rect">
-            <a:avLst/>
-          </a:prstGeom>
-        </p:spPr>
-        <p:txBody>
-          <a:bodyPr spcFirstLastPara="1" wrap="square" lIns="91425" tIns="91425" rIns="91425" bIns="91425" anchor="t" anchorCtr="0">
-            <a:noAutofit/>
-          </a:bodyPr>
-          <a:lstStyle/>
-          <a:p>
-            <a:pPr marL="0" lvl="0" indent="0" algn="l" rtl="0">
-              <a:spcBef>
-                <a:spcPts val="0"/>
-              </a:spcBef>
-              <a:spcAft>
-                <a:spcPts val="0"/>
-              </a:spcAft>
-              <a:buNone/>
-            </a:pPr>
-            <a:r>
-              <a:rPr lang="pt-BR" dirty="0">
-                <a:solidFill>
-                  <a:srgbClr val="92D050"/>
-                </a:solidFill>
-              </a:rPr>
-              <a:t>Responsável de Suporte</a:t>
-            </a:r>
-          </a:p>
-        </p:txBody>
-      </p:sp>
-    </p:spTree>
-    <p:extLst>
-      <p:ext uri="{BB962C8B-B14F-4D97-AF65-F5344CB8AC3E}">
-        <p14:creationId xmlns:p14="http://schemas.microsoft.com/office/powerpoint/2010/main" val="226424975"/>
-      </p:ext>
-    </p:extLst>
-  </p:cSld>
-  <p:clrMapOvr>
-    <a:masterClrMapping/>
-  </p:clrMapOvr>
-  <mc:AlternateContent xmlns:mc="http://schemas.openxmlformats.org/markup-compatibility/2006" xmlns:p14="http://schemas.microsoft.com/office/powerpoint/2010/main">
-    <mc:Choice Requires="p14">
-      <p:transition spd="med" p14:dur="700">
-        <p:fade/>
-      </p:transition>
-    </mc:Choice>
-    <mc:Fallback xmlns="">
-      <p:transition spd="med">
-        <p:fade/>
-      </p:transition>
-    </mc:Fallback>
-  </mc:AlternateContent>
-</p:sld>
-</file>
-
-<file path=ppt/slides/slide17.xml><?xml version="1.0" encoding="utf-8"?>
-<p:sld xmlns:a="http://schemas.openxmlformats.org/drawingml/2006/main" xmlns:r="http://schemas.openxmlformats.org/officeDocument/2006/relationships" xmlns:p="http://schemas.openxmlformats.org/presentationml/2006/main">
-  <p:cSld>
-    <p:bg>
-      <p:bgPr>
-        <a:solidFill>
-          <a:srgbClr val="1F1F1F"/>
-        </a:solidFill>
-        <a:effectLst/>
-      </p:bgPr>
-    </p:bg>
-    <p:spTree>
-      <p:nvGrpSpPr>
-        <p:cNvPr id="1" name="Shape 322"/>
-        <p:cNvGrpSpPr/>
-        <p:nvPr/>
-      </p:nvGrpSpPr>
-      <p:grpSpPr>
-        <a:xfrm>
-          <a:off x="0" y="0"/>
-          <a:ext cx="0" cy="0"/>
-          <a:chOff x="0" y="0"/>
-          <a:chExt cx="0" cy="0"/>
-        </a:xfrm>
-      </p:grpSpPr>
-      <p:pic>
-        <p:nvPicPr>
-          <p:cNvPr id="8" name="Imagem 7" descr="Uma imagem contendo desenho&#10;&#10;Descrição gerada com muito alta confiança">
-            <a:extLst>
-              <a:ext uri="{FF2B5EF4-FFF2-40B4-BE49-F238E27FC236}">
-                <a16:creationId xmlns:a16="http://schemas.microsoft.com/office/drawing/2014/main" id="{93BAE167-8CD4-4D44-A4B7-8F072081DFC2}"/>
-              </a:ext>
-            </a:extLst>
-          </p:cNvPr>
-          <p:cNvPicPr>
-            <a:picLocks noChangeAspect="1"/>
-          </p:cNvPicPr>
-          <p:nvPr/>
-        </p:nvPicPr>
-        <p:blipFill rotWithShape="1">
-          <a:blip r:embed="rId3"/>
-          <a:srcRect b="58706"/>
-          <a:stretch/>
-        </p:blipFill>
-        <p:spPr>
-          <a:xfrm>
-            <a:off x="121234" y="1604342"/>
-            <a:ext cx="1668879" cy="1800072"/>
-          </a:xfrm>
-          <a:prstGeom prst="rect">
-            <a:avLst/>
-          </a:prstGeom>
-        </p:spPr>
-      </p:pic>
-      <p:sp>
-        <p:nvSpPr>
-          <p:cNvPr id="323" name="Google Shape;323;p20"/>
-          <p:cNvSpPr/>
-          <p:nvPr/>
-        </p:nvSpPr>
-        <p:spPr>
-          <a:xfrm>
-            <a:off x="8806631" y="0"/>
-            <a:ext cx="307184" cy="182052"/>
-          </a:xfrm>
-          <a:custGeom>
-            <a:avLst/>
-            <a:gdLst/>
-            <a:ahLst/>
-            <a:cxnLst/>
-            <a:rect l="l" t="t" r="r" b="b"/>
-            <a:pathLst>
-              <a:path w="5850" h="3467" extrusionOk="0">
-                <a:moveTo>
-                  <a:pt x="1" y="1"/>
-                </a:moveTo>
-                <a:cubicBezTo>
-                  <a:pt x="2025" y="1032"/>
-                  <a:pt x="3976" y="2191"/>
-                  <a:pt x="5849" y="3466"/>
-                </a:cubicBezTo>
-                <a:lnTo>
-                  <a:pt x="5849" y="1576"/>
-                </a:lnTo>
-                <a:cubicBezTo>
-                  <a:pt x="5012" y="1028"/>
-                  <a:pt x="4158" y="501"/>
-                  <a:pt x="3290" y="1"/>
-                </a:cubicBezTo>
-                <a:close/>
-              </a:path>
-            </a:pathLst>
-          </a:custGeom>
-          <a:solidFill>
-            <a:srgbClr val="454444"/>
-          </a:solidFill>
-          <a:ln>
-            <a:noFill/>
-          </a:ln>
-        </p:spPr>
-        <p:txBody>
-          <a:bodyPr spcFirstLastPara="1" wrap="square" lIns="91425" tIns="91425" rIns="91425" bIns="91425" anchor="ctr" anchorCtr="0">
-            <a:noAutofit/>
-          </a:bodyPr>
-          <a:lstStyle/>
-          <a:p>
-            <a:pPr marL="0" lvl="0" indent="0" algn="l" rtl="0">
-              <a:spcBef>
-                <a:spcPts val="0"/>
-              </a:spcBef>
-              <a:spcAft>
-                <a:spcPts val="0"/>
-              </a:spcAft>
-              <a:buNone/>
-            </a:pPr>
-            <a:endParaRPr/>
-          </a:p>
-        </p:txBody>
-      </p:sp>
-      <p:sp>
-        <p:nvSpPr>
-          <p:cNvPr id="324" name="Google Shape;324;p20"/>
-          <p:cNvSpPr/>
-          <p:nvPr/>
-        </p:nvSpPr>
-        <p:spPr>
-          <a:xfrm>
-            <a:off x="8765779" y="4940764"/>
-            <a:ext cx="348036" cy="202741"/>
-          </a:xfrm>
-          <a:custGeom>
-            <a:avLst/>
-            <a:gdLst/>
-            <a:ahLst/>
-            <a:cxnLst/>
-            <a:rect l="l" t="t" r="r" b="b"/>
-            <a:pathLst>
-              <a:path w="6628" h="3861" extrusionOk="0">
-                <a:moveTo>
-                  <a:pt x="6627" y="0"/>
-                </a:moveTo>
-                <a:cubicBezTo>
-                  <a:pt x="4515" y="1439"/>
-                  <a:pt x="2302" y="2731"/>
-                  <a:pt x="0" y="3860"/>
-                </a:cubicBezTo>
-                <a:lnTo>
-                  <a:pt x="3382" y="3860"/>
-                </a:lnTo>
-                <a:cubicBezTo>
-                  <a:pt x="4489" y="3241"/>
-                  <a:pt x="5569" y="2585"/>
-                  <a:pt x="6627" y="1890"/>
-                </a:cubicBezTo>
-                <a:lnTo>
-                  <a:pt x="6627" y="0"/>
-                </a:lnTo>
-                <a:close/>
-              </a:path>
-            </a:pathLst>
-          </a:custGeom>
-          <a:solidFill>
-            <a:srgbClr val="303030"/>
-          </a:solidFill>
-          <a:ln>
-            <a:noFill/>
-          </a:ln>
-        </p:spPr>
-        <p:txBody>
-          <a:bodyPr spcFirstLastPara="1" wrap="square" lIns="91425" tIns="91425" rIns="91425" bIns="91425" anchor="ctr" anchorCtr="0">
-            <a:noAutofit/>
-          </a:bodyPr>
-          <a:lstStyle/>
-          <a:p>
-            <a:pPr marL="0" lvl="0" indent="0" algn="l" rtl="0">
-              <a:spcBef>
-                <a:spcPts val="0"/>
-              </a:spcBef>
-              <a:spcAft>
-                <a:spcPts val="0"/>
-              </a:spcAft>
-              <a:buNone/>
-            </a:pPr>
-            <a:endParaRPr/>
-          </a:p>
-        </p:txBody>
-      </p:sp>
-      <p:sp>
-        <p:nvSpPr>
-          <p:cNvPr id="9" name="Google Shape;361;p23"/>
-          <p:cNvSpPr txBox="1">
-            <a:spLocks noGrp="1"/>
-          </p:cNvSpPr>
-          <p:nvPr>
-            <p:ph type="subTitle" idx="1"/>
-          </p:nvPr>
-        </p:nvSpPr>
-        <p:spPr>
-          <a:xfrm>
-            <a:off x="1808571" y="525322"/>
-            <a:ext cx="6693171" cy="1542964"/>
-          </a:xfrm>
-          <a:prstGeom prst="rect">
-            <a:avLst/>
-          </a:prstGeom>
-        </p:spPr>
-        <p:txBody>
-          <a:bodyPr spcFirstLastPara="1" wrap="square" lIns="91425" tIns="91425" rIns="91425" bIns="91425" anchor="t" anchorCtr="0">
-            <a:noAutofit/>
-          </a:bodyPr>
-          <a:lstStyle/>
-          <a:p>
-            <a:r>
-              <a:rPr lang="pt-BR" sz="2000" b="1" dirty="0"/>
-              <a:t>Eu, enquanto</a:t>
-            </a:r>
-            <a:r>
-              <a:rPr lang="pt-BR" sz="2000" dirty="0"/>
-              <a:t> responsável de suporte da loja, </a:t>
-            </a:r>
-            <a:r>
-              <a:rPr lang="pt-BR" sz="2000" b="1" dirty="0"/>
-              <a:t>quero</a:t>
-            </a:r>
-            <a:r>
-              <a:rPr lang="pt-BR" sz="2000" dirty="0"/>
-              <a:t> uma aplicação que monitore o computador dos atendentes </a:t>
-            </a:r>
-            <a:r>
-              <a:rPr lang="pt-BR" sz="2000" b="1" dirty="0"/>
-              <a:t>para</a:t>
-            </a:r>
-            <a:r>
-              <a:rPr lang="pt-BR" sz="2000" dirty="0"/>
-              <a:t> não precisar realizar contínuas manutenções.</a:t>
-            </a:r>
-          </a:p>
-        </p:txBody>
-      </p:sp>
-      <p:sp>
-        <p:nvSpPr>
-          <p:cNvPr id="10" name="Google Shape;361;p23"/>
-          <p:cNvSpPr txBox="1">
-            <a:spLocks/>
-          </p:cNvSpPr>
-          <p:nvPr/>
-        </p:nvSpPr>
-        <p:spPr>
-          <a:xfrm>
-            <a:off x="1808571" y="2767779"/>
-            <a:ext cx="6878229" cy="1934850"/>
-          </a:xfrm>
-          <a:prstGeom prst="rect">
-            <a:avLst/>
-          </a:prstGeom>
-          <a:noFill/>
-          <a:ln>
-            <a:noFill/>
-          </a:ln>
-        </p:spPr>
-        <p:txBody>
-          <a:bodyPr spcFirstLastPara="1" wrap="square" lIns="91425" tIns="91425" rIns="91425" bIns="91425" anchor="t" anchorCtr="0">
-            <a:noAutofit/>
-          </a:bodyPr>
-          <a:lstStyle>
-            <a:defPPr marR="0" lvl="0" algn="l" rtl="0">
-              <a:lnSpc>
-                <a:spcPct val="100000"/>
-              </a:lnSpc>
-              <a:spcBef>
-                <a:spcPts val="0"/>
-              </a:spcBef>
-              <a:spcAft>
-                <a:spcPts val="0"/>
-              </a:spcAft>
-            </a:defPPr>
-            <a:lvl1pPr marL="457200" marR="0" lvl="0" indent="-342900" algn="l" rtl="0">
-              <a:lnSpc>
-                <a:spcPct val="100000"/>
-              </a:lnSpc>
-              <a:spcBef>
-                <a:spcPts val="0"/>
-              </a:spcBef>
-              <a:spcAft>
-                <a:spcPts val="0"/>
-              </a:spcAft>
-              <a:buClr>
-                <a:srgbClr val="F3F3F3"/>
-              </a:buClr>
-              <a:buSzPts val="3000"/>
-              <a:buFont typeface="Roboto Light"/>
-              <a:buNone/>
-              <a:defRPr sz="3000" b="0" i="0" u="none" strike="noStrike" cap="none">
-                <a:solidFill>
-                  <a:srgbClr val="F3F3F3"/>
-                </a:solidFill>
-                <a:latin typeface="Roboto Thin"/>
-                <a:ea typeface="Roboto Thin"/>
-                <a:cs typeface="Roboto Thin"/>
-                <a:sym typeface="Roboto Thin"/>
-              </a:defRPr>
-            </a:lvl1pPr>
-            <a:lvl2pPr marL="914400" marR="0" lvl="1" indent="-317500" algn="ctr" rtl="0">
-              <a:lnSpc>
-                <a:spcPct val="100000"/>
-              </a:lnSpc>
-              <a:spcBef>
-                <a:spcPts val="0"/>
-              </a:spcBef>
-              <a:spcAft>
-                <a:spcPts val="0"/>
-              </a:spcAft>
-              <a:buClr>
-                <a:srgbClr val="F3F3F3"/>
-              </a:buClr>
-              <a:buSzPts val="2800"/>
-              <a:buFont typeface="Roboto Light"/>
-              <a:buNone/>
-              <a:defRPr sz="2800" b="0" i="0" u="none" strike="noStrike" cap="none">
-                <a:solidFill>
-                  <a:srgbClr val="F3F3F3"/>
-                </a:solidFill>
-                <a:latin typeface="Roboto Light"/>
-                <a:ea typeface="Roboto Light"/>
-                <a:cs typeface="Roboto Light"/>
-                <a:sym typeface="Roboto Light"/>
-              </a:defRPr>
-            </a:lvl2pPr>
-            <a:lvl3pPr marL="1371600" marR="0" lvl="2" indent="-317500" algn="ctr" rtl="0">
-              <a:lnSpc>
-                <a:spcPct val="100000"/>
-              </a:lnSpc>
-              <a:spcBef>
-                <a:spcPts val="0"/>
-              </a:spcBef>
-              <a:spcAft>
-                <a:spcPts val="0"/>
-              </a:spcAft>
-              <a:buClr>
-                <a:srgbClr val="F3F3F3"/>
-              </a:buClr>
-              <a:buSzPts val="2800"/>
-              <a:buFont typeface="Roboto Light"/>
-              <a:buNone/>
-              <a:defRPr sz="2800" b="0" i="0" u="none" strike="noStrike" cap="none">
-                <a:solidFill>
-                  <a:srgbClr val="F3F3F3"/>
-                </a:solidFill>
-                <a:latin typeface="Roboto Light"/>
-                <a:ea typeface="Roboto Light"/>
-                <a:cs typeface="Roboto Light"/>
-                <a:sym typeface="Roboto Light"/>
-              </a:defRPr>
-            </a:lvl3pPr>
-            <a:lvl4pPr marL="1828800" marR="0" lvl="3" indent="-317500" algn="ctr" rtl="0">
-              <a:lnSpc>
-                <a:spcPct val="100000"/>
-              </a:lnSpc>
-              <a:spcBef>
-                <a:spcPts val="0"/>
-              </a:spcBef>
-              <a:spcAft>
-                <a:spcPts val="0"/>
-              </a:spcAft>
-              <a:buClr>
-                <a:srgbClr val="F3F3F3"/>
-              </a:buClr>
-              <a:buSzPts val="2800"/>
-              <a:buFont typeface="Roboto Light"/>
-              <a:buNone/>
-              <a:defRPr sz="2800" b="0" i="0" u="none" strike="noStrike" cap="none">
-                <a:solidFill>
-                  <a:srgbClr val="F3F3F3"/>
-                </a:solidFill>
-                <a:latin typeface="Roboto Light"/>
-                <a:ea typeface="Roboto Light"/>
-                <a:cs typeface="Roboto Light"/>
-                <a:sym typeface="Roboto Light"/>
-              </a:defRPr>
-            </a:lvl4pPr>
-            <a:lvl5pPr marL="2286000" marR="0" lvl="4" indent="-317500" algn="ctr" rtl="0">
-              <a:lnSpc>
-                <a:spcPct val="100000"/>
-              </a:lnSpc>
-              <a:spcBef>
-                <a:spcPts val="0"/>
-              </a:spcBef>
-              <a:spcAft>
-                <a:spcPts val="0"/>
-              </a:spcAft>
-              <a:buClr>
-                <a:srgbClr val="F3F3F3"/>
-              </a:buClr>
-              <a:buSzPts val="2800"/>
-              <a:buFont typeface="Roboto Light"/>
-              <a:buNone/>
-              <a:defRPr sz="2800" b="0" i="0" u="none" strike="noStrike" cap="none">
-                <a:solidFill>
-                  <a:srgbClr val="F3F3F3"/>
-                </a:solidFill>
-                <a:latin typeface="Roboto Light"/>
-                <a:ea typeface="Roboto Light"/>
-                <a:cs typeface="Roboto Light"/>
-                <a:sym typeface="Roboto Light"/>
-              </a:defRPr>
-            </a:lvl5pPr>
-            <a:lvl6pPr marL="2743200" marR="0" lvl="5" indent="-317500" algn="ctr" rtl="0">
-              <a:lnSpc>
-                <a:spcPct val="100000"/>
-              </a:lnSpc>
-              <a:spcBef>
-                <a:spcPts val="0"/>
-              </a:spcBef>
-              <a:spcAft>
-                <a:spcPts val="0"/>
-              </a:spcAft>
-              <a:buClr>
-                <a:srgbClr val="F3F3F3"/>
-              </a:buClr>
-              <a:buSzPts val="2800"/>
-              <a:buFont typeface="Roboto Light"/>
-              <a:buNone/>
-              <a:defRPr sz="2800" b="0" i="0" u="none" strike="noStrike" cap="none">
-                <a:solidFill>
-                  <a:srgbClr val="F3F3F3"/>
-                </a:solidFill>
-                <a:latin typeface="Roboto Light"/>
-                <a:ea typeface="Roboto Light"/>
-                <a:cs typeface="Roboto Light"/>
-                <a:sym typeface="Roboto Light"/>
-              </a:defRPr>
-            </a:lvl6pPr>
-            <a:lvl7pPr marL="3200400" marR="0" lvl="6" indent="-317500" algn="ctr" rtl="0">
-              <a:lnSpc>
-                <a:spcPct val="100000"/>
-              </a:lnSpc>
-              <a:spcBef>
-                <a:spcPts val="0"/>
-              </a:spcBef>
-              <a:spcAft>
-                <a:spcPts val="0"/>
-              </a:spcAft>
-              <a:buClr>
-                <a:srgbClr val="F3F3F3"/>
-              </a:buClr>
-              <a:buSzPts val="2800"/>
-              <a:buFont typeface="Roboto Light"/>
-              <a:buNone/>
-              <a:defRPr sz="2800" b="0" i="0" u="none" strike="noStrike" cap="none">
-                <a:solidFill>
-                  <a:srgbClr val="F3F3F3"/>
-                </a:solidFill>
-                <a:latin typeface="Roboto Light"/>
-                <a:ea typeface="Roboto Light"/>
-                <a:cs typeface="Roboto Light"/>
-                <a:sym typeface="Roboto Light"/>
-              </a:defRPr>
-            </a:lvl7pPr>
-            <a:lvl8pPr marL="3657600" marR="0" lvl="7" indent="-317500" algn="ctr" rtl="0">
-              <a:lnSpc>
-                <a:spcPct val="100000"/>
-              </a:lnSpc>
-              <a:spcBef>
-                <a:spcPts val="0"/>
-              </a:spcBef>
-              <a:spcAft>
-                <a:spcPts val="0"/>
-              </a:spcAft>
-              <a:buClr>
-                <a:srgbClr val="F3F3F3"/>
-              </a:buClr>
-              <a:buSzPts val="2800"/>
-              <a:buFont typeface="Roboto Light"/>
-              <a:buNone/>
-              <a:defRPr sz="2800" b="0" i="0" u="none" strike="noStrike" cap="none">
-                <a:solidFill>
-                  <a:srgbClr val="F3F3F3"/>
-                </a:solidFill>
-                <a:latin typeface="Roboto Light"/>
-                <a:ea typeface="Roboto Light"/>
-                <a:cs typeface="Roboto Light"/>
-                <a:sym typeface="Roboto Light"/>
-              </a:defRPr>
-            </a:lvl8pPr>
-            <a:lvl9pPr marL="4114800" marR="0" lvl="8" indent="-317500" algn="ctr" rtl="0">
-              <a:lnSpc>
-                <a:spcPct val="100000"/>
-              </a:lnSpc>
-              <a:spcBef>
-                <a:spcPts val="0"/>
-              </a:spcBef>
-              <a:spcAft>
-                <a:spcPts val="0"/>
-              </a:spcAft>
-              <a:buClr>
-                <a:srgbClr val="F3F3F3"/>
-              </a:buClr>
-              <a:buSzPts val="2800"/>
-              <a:buFont typeface="Roboto Light"/>
-              <a:buNone/>
-              <a:defRPr sz="2800" b="0" i="0" u="none" strike="noStrike" cap="none">
-                <a:solidFill>
-                  <a:srgbClr val="F3F3F3"/>
-                </a:solidFill>
-                <a:latin typeface="Roboto Light"/>
-                <a:ea typeface="Roboto Light"/>
-                <a:cs typeface="Roboto Light"/>
-                <a:sym typeface="Roboto Light"/>
-              </a:defRPr>
-            </a:lvl9pPr>
-          </a:lstStyle>
-          <a:p>
-            <a:r>
-              <a:rPr lang="pt-BR" sz="2000" b="1" dirty="0"/>
-              <a:t>Para</a:t>
-            </a:r>
-            <a:r>
-              <a:rPr lang="pt-BR" sz="2000" dirty="0"/>
-              <a:t> que os caixas não congele, </a:t>
-            </a:r>
-            <a:r>
-              <a:rPr lang="pt-BR" sz="2000" b="1" dirty="0"/>
-              <a:t>enquanto</a:t>
-            </a:r>
-            <a:r>
-              <a:rPr lang="pt-BR" sz="2000" dirty="0"/>
-              <a:t> responsável de suporte da loja, </a:t>
-            </a:r>
-            <a:r>
-              <a:rPr lang="pt-BR" sz="2000" b="1" dirty="0"/>
-              <a:t>eu quero</a:t>
-            </a:r>
-            <a:r>
-              <a:rPr lang="pt-BR" sz="2000" dirty="0"/>
-              <a:t> uma aplicação que retorne dados de monitoramento do sistema operacional, </a:t>
-            </a:r>
-            <a:r>
-              <a:rPr lang="pt-BR" sz="2000" b="1" dirty="0"/>
-              <a:t>para </a:t>
-            </a:r>
-            <a:r>
-              <a:rPr lang="pt-BR" sz="2000" dirty="0"/>
-              <a:t>que seja possível prever quando ocorrerá um travamento do sistema e que seja possível evitar e não ocasionar filas nas lojas.</a:t>
-            </a:r>
-          </a:p>
-        </p:txBody>
-      </p:sp>
-    </p:spTree>
-    <p:extLst>
-      <p:ext uri="{BB962C8B-B14F-4D97-AF65-F5344CB8AC3E}">
-        <p14:creationId xmlns:p14="http://schemas.microsoft.com/office/powerpoint/2010/main" val="1619608166"/>
-      </p:ext>
-    </p:extLst>
-  </p:cSld>
-  <p:clrMapOvr>
-    <a:masterClrMapping/>
-  </p:clrMapOvr>
-  <mc:AlternateContent xmlns:mc="http://schemas.openxmlformats.org/markup-compatibility/2006" xmlns:p14="http://schemas.microsoft.com/office/powerpoint/2010/main">
-    <mc:Choice Requires="p14">
-      <p:transition spd="med" p14:dur="700">
-        <p:fade/>
-      </p:transition>
-    </mc:Choice>
-    <mc:Fallback xmlns="">
-      <p:transition spd="med">
-        <p:fade/>
-      </p:transition>
-    </mc:Fallback>
-  </mc:AlternateContent>
-</p:sld>
-</file>
-
-<file path=ppt/slides/slide18.xml><?xml version="1.0" encoding="utf-8"?>
-<p:sld xmlns:a="http://schemas.openxmlformats.org/drawingml/2006/main" xmlns:r="http://schemas.openxmlformats.org/officeDocument/2006/relationships" xmlns:p="http://schemas.openxmlformats.org/presentationml/2006/main">
-  <p:cSld>
-    <p:bg>
-      <p:bgPr>
-        <a:solidFill>
-          <a:srgbClr val="1F1F1F"/>
-        </a:solidFill>
-        <a:effectLst/>
-      </p:bgPr>
-    </p:bg>
-    <p:spTree>
-      <p:nvGrpSpPr>
-        <p:cNvPr id="1" name="Shape 322"/>
-        <p:cNvGrpSpPr/>
-        <p:nvPr/>
-      </p:nvGrpSpPr>
-      <p:grpSpPr>
-        <a:xfrm>
-          <a:off x="0" y="0"/>
-          <a:ext cx="0" cy="0"/>
-          <a:chOff x="0" y="0"/>
-          <a:chExt cx="0" cy="0"/>
-        </a:xfrm>
-      </p:grpSpPr>
-      <p:sp>
-        <p:nvSpPr>
-          <p:cNvPr id="323" name="Google Shape;323;p20"/>
-          <p:cNvSpPr/>
-          <p:nvPr/>
-        </p:nvSpPr>
-        <p:spPr>
-          <a:xfrm>
-            <a:off x="8806631" y="0"/>
-            <a:ext cx="307184" cy="182052"/>
-          </a:xfrm>
-          <a:custGeom>
-            <a:avLst/>
-            <a:gdLst/>
-            <a:ahLst/>
-            <a:cxnLst/>
-            <a:rect l="l" t="t" r="r" b="b"/>
-            <a:pathLst>
-              <a:path w="5850" h="3467" extrusionOk="0">
-                <a:moveTo>
-                  <a:pt x="1" y="1"/>
-                </a:moveTo>
-                <a:cubicBezTo>
-                  <a:pt x="2025" y="1032"/>
-                  <a:pt x="3976" y="2191"/>
-                  <a:pt x="5849" y="3466"/>
-                </a:cubicBezTo>
-                <a:lnTo>
-                  <a:pt x="5849" y="1576"/>
-                </a:lnTo>
-                <a:cubicBezTo>
-                  <a:pt x="5012" y="1028"/>
-                  <a:pt x="4158" y="501"/>
-                  <a:pt x="3290" y="1"/>
-                </a:cubicBezTo>
-                <a:close/>
-              </a:path>
-            </a:pathLst>
-          </a:custGeom>
-          <a:solidFill>
-            <a:srgbClr val="454444"/>
-          </a:solidFill>
-          <a:ln>
-            <a:noFill/>
-          </a:ln>
-        </p:spPr>
-        <p:txBody>
-          <a:bodyPr spcFirstLastPara="1" wrap="square" lIns="91425" tIns="91425" rIns="91425" bIns="91425" anchor="ctr" anchorCtr="0">
-            <a:noAutofit/>
-          </a:bodyPr>
-          <a:lstStyle/>
-          <a:p>
-            <a:pPr marL="0" lvl="0" indent="0" algn="l" rtl="0">
-              <a:spcBef>
-                <a:spcPts val="0"/>
-              </a:spcBef>
-              <a:spcAft>
-                <a:spcPts val="0"/>
-              </a:spcAft>
-              <a:buNone/>
-            </a:pPr>
-            <a:endParaRPr/>
-          </a:p>
-        </p:txBody>
-      </p:sp>
-      <p:sp>
-        <p:nvSpPr>
-          <p:cNvPr id="324" name="Google Shape;324;p20"/>
-          <p:cNvSpPr/>
-          <p:nvPr/>
-        </p:nvSpPr>
-        <p:spPr>
-          <a:xfrm>
-            <a:off x="8765779" y="4940764"/>
-            <a:ext cx="348036" cy="202741"/>
-          </a:xfrm>
-          <a:custGeom>
-            <a:avLst/>
-            <a:gdLst/>
-            <a:ahLst/>
-            <a:cxnLst/>
-            <a:rect l="l" t="t" r="r" b="b"/>
-            <a:pathLst>
-              <a:path w="6628" h="3861" extrusionOk="0">
-                <a:moveTo>
-                  <a:pt x="6627" y="0"/>
-                </a:moveTo>
-                <a:cubicBezTo>
-                  <a:pt x="4515" y="1439"/>
-                  <a:pt x="2302" y="2731"/>
-                  <a:pt x="0" y="3860"/>
-                </a:cubicBezTo>
-                <a:lnTo>
-                  <a:pt x="3382" y="3860"/>
-                </a:lnTo>
-                <a:cubicBezTo>
-                  <a:pt x="4489" y="3241"/>
-                  <a:pt x="5569" y="2585"/>
-                  <a:pt x="6627" y="1890"/>
-                </a:cubicBezTo>
-                <a:lnTo>
-                  <a:pt x="6627" y="0"/>
-                </a:lnTo>
-                <a:close/>
-              </a:path>
-            </a:pathLst>
-          </a:custGeom>
-          <a:solidFill>
-            <a:srgbClr val="303030"/>
-          </a:solidFill>
-          <a:ln>
-            <a:noFill/>
-          </a:ln>
-        </p:spPr>
-        <p:txBody>
-          <a:bodyPr spcFirstLastPara="1" wrap="square" lIns="91425" tIns="91425" rIns="91425" bIns="91425" anchor="ctr" anchorCtr="0">
-            <a:noAutofit/>
-          </a:bodyPr>
-          <a:lstStyle/>
-          <a:p>
-            <a:pPr marL="0" lvl="0" indent="0" algn="l" rtl="0">
-              <a:spcBef>
-                <a:spcPts val="0"/>
-              </a:spcBef>
-              <a:spcAft>
-                <a:spcPts val="0"/>
-              </a:spcAft>
-              <a:buNone/>
-            </a:pPr>
-            <a:endParaRPr/>
-          </a:p>
-        </p:txBody>
-      </p:sp>
-      <p:sp>
-        <p:nvSpPr>
-          <p:cNvPr id="325" name="Google Shape;325;p20"/>
-          <p:cNvSpPr txBox="1">
-            <a:spLocks noGrp="1"/>
-          </p:cNvSpPr>
-          <p:nvPr>
-            <p:ph type="ctrTitle"/>
-          </p:nvPr>
-        </p:nvSpPr>
-        <p:spPr>
-          <a:xfrm>
-            <a:off x="720000" y="804075"/>
-            <a:ext cx="7704000" cy="1989000"/>
-          </a:xfrm>
-          <a:prstGeom prst="rect">
-            <a:avLst/>
-          </a:prstGeom>
-        </p:spPr>
-        <p:txBody>
-          <a:bodyPr spcFirstLastPara="1" wrap="square" lIns="91425" tIns="91425" rIns="91425" bIns="91425" anchor="b" anchorCtr="0">
-            <a:noAutofit/>
-          </a:bodyPr>
-          <a:lstStyle/>
-          <a:p>
-            <a:pPr marL="0" lvl="0" indent="0" algn="l" rtl="0">
-              <a:spcBef>
-                <a:spcPts val="0"/>
-              </a:spcBef>
-              <a:spcAft>
-                <a:spcPts val="0"/>
-              </a:spcAft>
-              <a:buNone/>
-            </a:pPr>
-            <a:r>
-              <a:rPr lang="pt-BR" dirty="0">
-                <a:latin typeface="Josefin Sans"/>
-                <a:ea typeface="Josefin Sans"/>
-                <a:cs typeface="Josefin Sans"/>
-                <a:sym typeface="Josefin Sans"/>
-              </a:rPr>
-              <a:t>PROTO-PERSONA</a:t>
-            </a:r>
-            <a:endParaRPr dirty="0">
-              <a:latin typeface="Josefin Sans"/>
-              <a:ea typeface="Josefin Sans"/>
-              <a:cs typeface="Josefin Sans"/>
-              <a:sym typeface="Josefin Sans"/>
-            </a:endParaRPr>
-          </a:p>
-        </p:txBody>
-      </p:sp>
-      <p:cxnSp>
-        <p:nvCxnSpPr>
-          <p:cNvPr id="327" name="Google Shape;327;p20"/>
-          <p:cNvCxnSpPr/>
-          <p:nvPr/>
-        </p:nvCxnSpPr>
-        <p:spPr>
-          <a:xfrm>
-            <a:off x="841434" y="2762125"/>
-            <a:ext cx="373800" cy="0"/>
-          </a:xfrm>
-          <a:prstGeom prst="straightConnector1">
-            <a:avLst/>
-          </a:prstGeom>
-          <a:noFill/>
-          <a:ln w="19050" cap="flat" cmpd="sng">
-            <a:solidFill>
-              <a:srgbClr val="F3F3F3"/>
-            </a:solidFill>
-            <a:prstDash val="solid"/>
-            <a:round/>
-            <a:headEnd type="none" w="med" len="med"/>
-            <a:tailEnd type="none" w="med" len="med"/>
-          </a:ln>
-        </p:spPr>
-      </p:cxnSp>
-      <p:pic>
-        <p:nvPicPr>
-          <p:cNvPr id="14" name="Imagem 13">
-            <a:extLst>
-              <a:ext uri="{FF2B5EF4-FFF2-40B4-BE49-F238E27FC236}">
-                <a16:creationId xmlns:a16="http://schemas.microsoft.com/office/drawing/2014/main" id="{A1546BA2-A746-4D78-BA2A-66EACE53308E}"/>
-              </a:ext>
-            </a:extLst>
-          </p:cNvPr>
-          <p:cNvPicPr>
-            <a:picLocks noChangeAspect="1"/>
-          </p:cNvPicPr>
-          <p:nvPr/>
-        </p:nvPicPr>
-        <p:blipFill>
-          <a:blip r:embed="rId3">
-            <a:extLst>
-              <a:ext uri="{28A0092B-C50C-407E-A947-70E740481C1C}">
-                <a14:useLocalDpi xmlns:a14="http://schemas.microsoft.com/office/drawing/2010/main" val="0"/>
-              </a:ext>
-            </a:extLst>
-          </a:blip>
-          <a:stretch>
-            <a:fillRect/>
-          </a:stretch>
-        </p:blipFill>
-        <p:spPr>
-          <a:xfrm>
-            <a:off x="6411514" y="1407885"/>
-            <a:ext cx="2133920" cy="2133920"/>
-          </a:xfrm>
-          <a:prstGeom prst="rect">
-            <a:avLst/>
-          </a:prstGeom>
-        </p:spPr>
-      </p:pic>
-      <p:sp>
-        <p:nvSpPr>
-          <p:cNvPr id="7" name="Google Shape;326;p20"/>
-          <p:cNvSpPr txBox="1">
-            <a:spLocks noGrp="1"/>
-          </p:cNvSpPr>
-          <p:nvPr>
-            <p:ph type="subTitle" idx="1"/>
-          </p:nvPr>
-        </p:nvSpPr>
-        <p:spPr>
-          <a:xfrm>
-            <a:off x="720000" y="2837638"/>
-            <a:ext cx="4448400" cy="1044600"/>
-          </a:xfrm>
-          <a:prstGeom prst="rect">
-            <a:avLst/>
-          </a:prstGeom>
-        </p:spPr>
-        <p:txBody>
-          <a:bodyPr spcFirstLastPara="1" wrap="square" lIns="91425" tIns="91425" rIns="91425" bIns="91425" anchor="t" anchorCtr="0">
-            <a:noAutofit/>
-          </a:bodyPr>
-          <a:lstStyle/>
-          <a:p>
-            <a:pPr marL="0" lvl="0" indent="0" algn="l" rtl="0">
-              <a:spcBef>
-                <a:spcPts val="0"/>
-              </a:spcBef>
-              <a:spcAft>
-                <a:spcPts val="0"/>
-              </a:spcAft>
-              <a:buNone/>
-            </a:pPr>
-            <a:r>
-              <a:rPr lang="pt-BR" dirty="0">
-                <a:solidFill>
-                  <a:srgbClr val="92D050"/>
-                </a:solidFill>
-              </a:rPr>
-              <a:t>Responsável de Suporte</a:t>
-            </a:r>
-          </a:p>
-        </p:txBody>
-      </p:sp>
     </p:spTree>
     <p:extLst>
       <p:ext uri="{BB962C8B-B14F-4D97-AF65-F5344CB8AC3E}">
@@ -22806,7 +20705,7 @@
 </p:sld>
 </file>
 
-<file path=ppt/slides/slide19.xml><?xml version="1.0" encoding="utf-8"?>
+<file path=ppt/slides/slide15.xml><?xml version="1.0" encoding="utf-8"?>
 <p:sld xmlns:a="http://schemas.openxmlformats.org/drawingml/2006/main" xmlns:r="http://schemas.openxmlformats.org/officeDocument/2006/relationships" xmlns:p="http://schemas.openxmlformats.org/presentationml/2006/main">
   <p:cSld>
     <p:bg>
@@ -23602,742 +21501,7 @@
 </p:sld>
 </file>
 
-<file path=ppt/slides/slide2.xml><?xml version="1.0" encoding="utf-8"?>
-<p:sld xmlns:a="http://schemas.openxmlformats.org/drawingml/2006/main" xmlns:r="http://schemas.openxmlformats.org/officeDocument/2006/relationships" xmlns:p="http://schemas.openxmlformats.org/presentationml/2006/main">
-  <p:cSld>
-    <p:bg>
-      <p:bgPr>
-        <a:solidFill>
-          <a:srgbClr val="1F1F1F"/>
-        </a:solidFill>
-        <a:effectLst/>
-      </p:bgPr>
-    </p:bg>
-    <p:spTree>
-      <p:nvGrpSpPr>
-        <p:cNvPr id="1" name="Shape 438"/>
-        <p:cNvGrpSpPr/>
-        <p:nvPr/>
-      </p:nvGrpSpPr>
-      <p:grpSpPr>
-        <a:xfrm>
-          <a:off x="0" y="0"/>
-          <a:ext cx="0" cy="0"/>
-          <a:chOff x="0" y="0"/>
-          <a:chExt cx="0" cy="0"/>
-        </a:xfrm>
-      </p:grpSpPr>
-      <p:cxnSp>
-        <p:nvCxnSpPr>
-          <p:cNvPr id="442" name="Google Shape;442;p27"/>
-          <p:cNvCxnSpPr/>
-          <p:nvPr/>
-        </p:nvCxnSpPr>
-        <p:spPr>
-          <a:xfrm>
-            <a:off x="1844542" y="1370756"/>
-            <a:ext cx="373800" cy="0"/>
-          </a:xfrm>
-          <a:prstGeom prst="straightConnector1">
-            <a:avLst/>
-          </a:prstGeom>
-          <a:noFill/>
-          <a:ln w="19050" cap="flat" cmpd="sng">
-            <a:solidFill>
-              <a:srgbClr val="F3F3F3"/>
-            </a:solidFill>
-            <a:prstDash val="solid"/>
-            <a:round/>
-            <a:headEnd type="none" w="med" len="med"/>
-            <a:tailEnd type="none" w="med" len="med"/>
-          </a:ln>
-        </p:spPr>
-      </p:cxnSp>
-      <p:cxnSp>
-        <p:nvCxnSpPr>
-          <p:cNvPr id="443" name="Google Shape;443;p27"/>
-          <p:cNvCxnSpPr/>
-          <p:nvPr/>
-        </p:nvCxnSpPr>
-        <p:spPr>
-          <a:xfrm>
-            <a:off x="6434861" y="1402174"/>
-            <a:ext cx="373800" cy="0"/>
-          </a:xfrm>
-          <a:prstGeom prst="straightConnector1">
-            <a:avLst/>
-          </a:prstGeom>
-          <a:noFill/>
-          <a:ln w="19050" cap="flat" cmpd="sng">
-            <a:solidFill>
-              <a:srgbClr val="F3F3F3"/>
-            </a:solidFill>
-            <a:prstDash val="solid"/>
-            <a:round/>
-            <a:headEnd type="none" w="med" len="med"/>
-            <a:tailEnd type="none" w="med" len="med"/>
-          </a:ln>
-        </p:spPr>
-      </p:cxnSp>
-      <p:sp>
-        <p:nvSpPr>
-          <p:cNvPr id="444" name="Google Shape;444;p27"/>
-          <p:cNvSpPr txBox="1">
-            <a:spLocks noGrp="1"/>
-          </p:cNvSpPr>
-          <p:nvPr>
-            <p:ph type="subTitle" idx="1"/>
-          </p:nvPr>
-        </p:nvSpPr>
-        <p:spPr>
-          <a:xfrm>
-            <a:off x="230657" y="712348"/>
-            <a:ext cx="3556800" cy="538371"/>
-          </a:xfrm>
-          <a:prstGeom prst="rect">
-            <a:avLst/>
-          </a:prstGeom>
-        </p:spPr>
-        <p:txBody>
-          <a:bodyPr spcFirstLastPara="1" wrap="square" lIns="91425" tIns="91425" rIns="91425" bIns="91425" anchor="ctr" anchorCtr="0">
-            <a:noAutofit/>
-          </a:bodyPr>
-          <a:lstStyle/>
-          <a:p>
-            <a:pPr marL="0" lvl="0" indent="0" algn="ctr" rtl="0">
-              <a:spcBef>
-                <a:spcPts val="0"/>
-              </a:spcBef>
-              <a:spcAft>
-                <a:spcPts val="1600"/>
-              </a:spcAft>
-              <a:buNone/>
-            </a:pPr>
-            <a:r>
-              <a:rPr lang="en" dirty="0">
-                <a:solidFill>
-                  <a:srgbClr val="00B0F0"/>
-                </a:solidFill>
-              </a:rPr>
-              <a:t>Henrique Carlos</a:t>
-            </a:r>
-            <a:endParaRPr dirty="0">
-              <a:solidFill>
-                <a:srgbClr val="00B0F0"/>
-              </a:solidFill>
-            </a:endParaRPr>
-          </a:p>
-        </p:txBody>
-      </p:sp>
-      <p:sp>
-        <p:nvSpPr>
-          <p:cNvPr id="445" name="Google Shape;445;p27"/>
-          <p:cNvSpPr txBox="1">
-            <a:spLocks noGrp="1"/>
-          </p:cNvSpPr>
-          <p:nvPr>
-            <p:ph type="subTitle" idx="2"/>
-          </p:nvPr>
-        </p:nvSpPr>
-        <p:spPr>
-          <a:xfrm>
-            <a:off x="4843361" y="743449"/>
-            <a:ext cx="3556800" cy="538371"/>
-          </a:xfrm>
-          <a:prstGeom prst="rect">
-            <a:avLst/>
-          </a:prstGeom>
-        </p:spPr>
-        <p:txBody>
-          <a:bodyPr spcFirstLastPara="1" wrap="square" lIns="91425" tIns="91425" rIns="91425" bIns="91425" anchor="ctr" anchorCtr="0">
-            <a:noAutofit/>
-          </a:bodyPr>
-          <a:lstStyle/>
-          <a:p>
-            <a:pPr marL="0" lvl="0" indent="0" algn="ctr" rtl="0">
-              <a:spcBef>
-                <a:spcPts val="0"/>
-              </a:spcBef>
-              <a:spcAft>
-                <a:spcPts val="1600"/>
-              </a:spcAft>
-              <a:buNone/>
-            </a:pPr>
-            <a:r>
-              <a:rPr lang="en" dirty="0">
-                <a:solidFill>
-                  <a:srgbClr val="00B0F0"/>
-                </a:solidFill>
-              </a:rPr>
-              <a:t>Maycon Maia</a:t>
-            </a:r>
-            <a:endParaRPr dirty="0">
-              <a:solidFill>
-                <a:srgbClr val="00B0F0"/>
-              </a:solidFill>
-            </a:endParaRPr>
-          </a:p>
-        </p:txBody>
-      </p:sp>
-      <p:sp>
-        <p:nvSpPr>
-          <p:cNvPr id="446" name="Google Shape;446;p27"/>
-          <p:cNvSpPr txBox="1">
-            <a:spLocks noGrp="1"/>
-          </p:cNvSpPr>
-          <p:nvPr>
-            <p:ph type="subTitle" idx="3"/>
-          </p:nvPr>
-        </p:nvSpPr>
-        <p:spPr>
-          <a:xfrm>
-            <a:off x="661529" y="1370756"/>
-            <a:ext cx="2871836" cy="788100"/>
-          </a:xfrm>
-          <a:prstGeom prst="rect">
-            <a:avLst/>
-          </a:prstGeom>
-        </p:spPr>
-        <p:txBody>
-          <a:bodyPr spcFirstLastPara="1" wrap="square" lIns="91425" tIns="91425" rIns="91425" bIns="91425" anchor="t" anchorCtr="0">
-            <a:noAutofit/>
-          </a:bodyPr>
-          <a:lstStyle/>
-          <a:p>
-            <a:pPr marL="0" lvl="0" indent="0" algn="ctr" rtl="0">
-              <a:spcBef>
-                <a:spcPts val="0"/>
-              </a:spcBef>
-              <a:spcAft>
-                <a:spcPts val="1600"/>
-              </a:spcAft>
-              <a:buNone/>
-            </a:pPr>
-            <a:r>
-              <a:rPr lang="en" dirty="0">
-                <a:solidFill>
-                  <a:srgbClr val="92D050"/>
-                </a:solidFill>
-              </a:rPr>
-              <a:t>Web Designer</a:t>
-            </a:r>
-            <a:endParaRPr dirty="0">
-              <a:solidFill>
-                <a:srgbClr val="92D050"/>
-              </a:solidFill>
-            </a:endParaRPr>
-          </a:p>
-        </p:txBody>
-      </p:sp>
-      <p:sp>
-        <p:nvSpPr>
-          <p:cNvPr id="447" name="Google Shape;447;p27"/>
-          <p:cNvSpPr txBox="1">
-            <a:spLocks noGrp="1"/>
-          </p:cNvSpPr>
-          <p:nvPr>
-            <p:ph type="subTitle" idx="4"/>
-          </p:nvPr>
-        </p:nvSpPr>
-        <p:spPr>
-          <a:xfrm>
-            <a:off x="4484915" y="1402174"/>
-            <a:ext cx="4659056" cy="788100"/>
-          </a:xfrm>
-          <a:prstGeom prst="rect">
-            <a:avLst/>
-          </a:prstGeom>
-        </p:spPr>
-        <p:txBody>
-          <a:bodyPr spcFirstLastPara="1" wrap="square" lIns="91425" tIns="91425" rIns="91425" bIns="91425" anchor="t" anchorCtr="0">
-            <a:noAutofit/>
-          </a:bodyPr>
-          <a:lstStyle/>
-          <a:p>
-            <a:pPr marL="0" lvl="0" indent="0" algn="ctr" rtl="0">
-              <a:spcBef>
-                <a:spcPts val="0"/>
-              </a:spcBef>
-              <a:spcAft>
-                <a:spcPts val="1600"/>
-              </a:spcAft>
-              <a:buNone/>
-            </a:pPr>
-            <a:r>
-              <a:rPr lang="en" sz="2800" dirty="0">
-                <a:solidFill>
-                  <a:srgbClr val="92D050"/>
-                </a:solidFill>
-              </a:rPr>
-              <a:t>Analista de Banco de Dados</a:t>
-            </a:r>
-            <a:endParaRPr sz="2800" dirty="0">
-              <a:solidFill>
-                <a:srgbClr val="92D050"/>
-              </a:solidFill>
-            </a:endParaRPr>
-          </a:p>
-        </p:txBody>
-      </p:sp>
-      <p:pic>
-        <p:nvPicPr>
-          <p:cNvPr id="4" name="Imagem 3"/>
-          <p:cNvPicPr>
-            <a:picLocks noChangeAspect="1"/>
-          </p:cNvPicPr>
-          <p:nvPr/>
-        </p:nvPicPr>
-        <p:blipFill>
-          <a:blip r:embed="rId3">
-            <a:extLst>
-              <a:ext uri="{28A0092B-C50C-407E-A947-70E740481C1C}">
-                <a14:useLocalDpi xmlns:a14="http://schemas.microsoft.com/office/drawing/2010/main" val="0"/>
-              </a:ext>
-            </a:extLst>
-          </a:blip>
-          <a:stretch>
-            <a:fillRect/>
-          </a:stretch>
-        </p:blipFill>
-        <p:spPr>
-          <a:xfrm>
-            <a:off x="767152" y="2041739"/>
-            <a:ext cx="2483809" cy="3101761"/>
-          </a:xfrm>
-          <a:prstGeom prst="rect">
-            <a:avLst/>
-          </a:prstGeom>
-        </p:spPr>
-      </p:pic>
-      <p:pic>
-        <p:nvPicPr>
-          <p:cNvPr id="5" name="Imagem 4"/>
-          <p:cNvPicPr>
-            <a:picLocks noChangeAspect="1"/>
-          </p:cNvPicPr>
-          <p:nvPr/>
-        </p:nvPicPr>
-        <p:blipFill>
-          <a:blip r:embed="rId4">
-            <a:extLst>
-              <a:ext uri="{28A0092B-C50C-407E-A947-70E740481C1C}">
-                <a14:useLocalDpi xmlns:a14="http://schemas.microsoft.com/office/drawing/2010/main" val="0"/>
-              </a:ext>
-            </a:extLst>
-          </a:blip>
-          <a:stretch>
-            <a:fillRect/>
-          </a:stretch>
-        </p:blipFill>
-        <p:spPr>
-          <a:xfrm>
-            <a:off x="5277931" y="2041738"/>
-            <a:ext cx="3061459" cy="3101762"/>
-          </a:xfrm>
-          <a:prstGeom prst="rect">
-            <a:avLst/>
-          </a:prstGeom>
-        </p:spPr>
-      </p:pic>
-      <p:pic>
-        <p:nvPicPr>
-          <p:cNvPr id="22" name="Imagem 21">
-            <a:extLst>
-              <a:ext uri="{FF2B5EF4-FFF2-40B4-BE49-F238E27FC236}">
-                <a16:creationId xmlns:a16="http://schemas.microsoft.com/office/drawing/2014/main" id="{A1546BA2-A746-4D78-BA2A-66EACE53308E}"/>
-              </a:ext>
-            </a:extLst>
-          </p:cNvPr>
-          <p:cNvPicPr>
-            <a:picLocks noChangeAspect="1"/>
-          </p:cNvPicPr>
-          <p:nvPr/>
-        </p:nvPicPr>
-        <p:blipFill>
-          <a:blip r:embed="rId5">
-            <a:extLst>
-              <a:ext uri="{28A0092B-C50C-407E-A947-70E740481C1C}">
-                <a14:useLocalDpi xmlns:a14="http://schemas.microsoft.com/office/drawing/2010/main" val="0"/>
-              </a:ext>
-            </a:extLst>
-          </a:blip>
-          <a:stretch>
-            <a:fillRect/>
-          </a:stretch>
-        </p:blipFill>
-        <p:spPr>
-          <a:xfrm>
-            <a:off x="196483" y="175701"/>
-            <a:ext cx="533852" cy="533852"/>
-          </a:xfrm>
-          <a:prstGeom prst="rect">
-            <a:avLst/>
-          </a:prstGeom>
-        </p:spPr>
-      </p:pic>
-    </p:spTree>
-  </p:cSld>
-  <p:clrMapOvr>
-    <a:masterClrMapping/>
-  </p:clrMapOvr>
-  <mc:AlternateContent xmlns:mc="http://schemas.openxmlformats.org/markup-compatibility/2006" xmlns:p14="http://schemas.microsoft.com/office/powerpoint/2010/main">
-    <mc:Choice Requires="p14">
-      <p:transition spd="med" p14:dur="700">
-        <p:fade/>
-      </p:transition>
-    </mc:Choice>
-    <mc:Fallback xmlns="">
-      <p:transition spd="med">
-        <p:fade/>
-      </p:transition>
-    </mc:Fallback>
-  </mc:AlternateContent>
-</p:sld>
-</file>
-
-<file path=ppt/slides/slide20.xml><?xml version="1.0" encoding="utf-8"?>
-<p:sld xmlns:a="http://schemas.openxmlformats.org/drawingml/2006/main" xmlns:r="http://schemas.openxmlformats.org/officeDocument/2006/relationships" xmlns:p="http://schemas.openxmlformats.org/presentationml/2006/main">
-  <p:cSld>
-    <p:bg>
-      <p:bgPr>
-        <a:solidFill>
-          <a:srgbClr val="1F1F1F"/>
-        </a:solidFill>
-        <a:effectLst/>
-      </p:bgPr>
-    </p:bg>
-    <p:spTree>
-      <p:nvGrpSpPr>
-        <p:cNvPr id="1" name="Shape 322"/>
-        <p:cNvGrpSpPr/>
-        <p:nvPr/>
-      </p:nvGrpSpPr>
-      <p:grpSpPr>
-        <a:xfrm>
-          <a:off x="0" y="0"/>
-          <a:ext cx="0" cy="0"/>
-          <a:chOff x="0" y="0"/>
-          <a:chExt cx="0" cy="0"/>
-        </a:xfrm>
-      </p:grpSpPr>
-      <p:sp>
-        <p:nvSpPr>
-          <p:cNvPr id="323" name="Google Shape;323;p20"/>
-          <p:cNvSpPr/>
-          <p:nvPr/>
-        </p:nvSpPr>
-        <p:spPr>
-          <a:xfrm>
-            <a:off x="8806631" y="0"/>
-            <a:ext cx="307184" cy="182052"/>
-          </a:xfrm>
-          <a:custGeom>
-            <a:avLst/>
-            <a:gdLst/>
-            <a:ahLst/>
-            <a:cxnLst/>
-            <a:rect l="l" t="t" r="r" b="b"/>
-            <a:pathLst>
-              <a:path w="5850" h="3467" extrusionOk="0">
-                <a:moveTo>
-                  <a:pt x="1" y="1"/>
-                </a:moveTo>
-                <a:cubicBezTo>
-                  <a:pt x="2025" y="1032"/>
-                  <a:pt x="3976" y="2191"/>
-                  <a:pt x="5849" y="3466"/>
-                </a:cubicBezTo>
-                <a:lnTo>
-                  <a:pt x="5849" y="1576"/>
-                </a:lnTo>
-                <a:cubicBezTo>
-                  <a:pt x="5012" y="1028"/>
-                  <a:pt x="4158" y="501"/>
-                  <a:pt x="3290" y="1"/>
-                </a:cubicBezTo>
-                <a:close/>
-              </a:path>
-            </a:pathLst>
-          </a:custGeom>
-          <a:solidFill>
-            <a:srgbClr val="454444"/>
-          </a:solidFill>
-          <a:ln>
-            <a:noFill/>
-          </a:ln>
-        </p:spPr>
-        <p:txBody>
-          <a:bodyPr spcFirstLastPara="1" wrap="square" lIns="91425" tIns="91425" rIns="91425" bIns="91425" anchor="ctr" anchorCtr="0">
-            <a:noAutofit/>
-          </a:bodyPr>
-          <a:lstStyle/>
-          <a:p>
-            <a:pPr marL="0" lvl="0" indent="0" algn="l" rtl="0">
-              <a:spcBef>
-                <a:spcPts val="0"/>
-              </a:spcBef>
-              <a:spcAft>
-                <a:spcPts val="0"/>
-              </a:spcAft>
-              <a:buNone/>
-            </a:pPr>
-            <a:endParaRPr/>
-          </a:p>
-        </p:txBody>
-      </p:sp>
-      <p:sp>
-        <p:nvSpPr>
-          <p:cNvPr id="324" name="Google Shape;324;p20"/>
-          <p:cNvSpPr/>
-          <p:nvPr/>
-        </p:nvSpPr>
-        <p:spPr>
-          <a:xfrm>
-            <a:off x="8765779" y="4940764"/>
-            <a:ext cx="348036" cy="202741"/>
-          </a:xfrm>
-          <a:custGeom>
-            <a:avLst/>
-            <a:gdLst/>
-            <a:ahLst/>
-            <a:cxnLst/>
-            <a:rect l="l" t="t" r="r" b="b"/>
-            <a:pathLst>
-              <a:path w="6628" h="3861" extrusionOk="0">
-                <a:moveTo>
-                  <a:pt x="6627" y="0"/>
-                </a:moveTo>
-                <a:cubicBezTo>
-                  <a:pt x="4515" y="1439"/>
-                  <a:pt x="2302" y="2731"/>
-                  <a:pt x="0" y="3860"/>
-                </a:cubicBezTo>
-                <a:lnTo>
-                  <a:pt x="3382" y="3860"/>
-                </a:lnTo>
-                <a:cubicBezTo>
-                  <a:pt x="4489" y="3241"/>
-                  <a:pt x="5569" y="2585"/>
-                  <a:pt x="6627" y="1890"/>
-                </a:cubicBezTo>
-                <a:lnTo>
-                  <a:pt x="6627" y="0"/>
-                </a:lnTo>
-                <a:close/>
-              </a:path>
-            </a:pathLst>
-          </a:custGeom>
-          <a:solidFill>
-            <a:srgbClr val="303030"/>
-          </a:solidFill>
-          <a:ln>
-            <a:noFill/>
-          </a:ln>
-        </p:spPr>
-        <p:txBody>
-          <a:bodyPr spcFirstLastPara="1" wrap="square" lIns="91425" tIns="91425" rIns="91425" bIns="91425" anchor="ctr" anchorCtr="0">
-            <a:noAutofit/>
-          </a:bodyPr>
-          <a:lstStyle/>
-          <a:p>
-            <a:pPr marL="0" lvl="0" indent="0" algn="l" rtl="0">
-              <a:spcBef>
-                <a:spcPts val="0"/>
-              </a:spcBef>
-              <a:spcAft>
-                <a:spcPts val="0"/>
-              </a:spcAft>
-              <a:buNone/>
-            </a:pPr>
-            <a:endParaRPr/>
-          </a:p>
-        </p:txBody>
-      </p:sp>
-      <p:sp>
-        <p:nvSpPr>
-          <p:cNvPr id="325" name="Google Shape;325;p20"/>
-          <p:cNvSpPr txBox="1">
-            <a:spLocks noGrp="1"/>
-          </p:cNvSpPr>
-          <p:nvPr>
-            <p:ph type="ctrTitle"/>
-          </p:nvPr>
-        </p:nvSpPr>
-        <p:spPr>
-          <a:xfrm>
-            <a:off x="720000" y="804075"/>
-            <a:ext cx="7704000" cy="1989000"/>
-          </a:xfrm>
-          <a:prstGeom prst="rect">
-            <a:avLst/>
-          </a:prstGeom>
-        </p:spPr>
-        <p:txBody>
-          <a:bodyPr spcFirstLastPara="1" wrap="square" lIns="91425" tIns="91425" rIns="91425" bIns="91425" anchor="b" anchorCtr="0">
-            <a:noAutofit/>
-          </a:bodyPr>
-          <a:lstStyle/>
-          <a:p>
-            <a:pPr marL="0" lvl="0" indent="0" algn="l" rtl="0">
-              <a:spcBef>
-                <a:spcPts val="0"/>
-              </a:spcBef>
-              <a:spcAft>
-                <a:spcPts val="0"/>
-              </a:spcAft>
-              <a:buNone/>
-            </a:pPr>
-            <a:r>
-              <a:rPr lang="pt-BR" dirty="0">
-                <a:latin typeface="Josefin Sans"/>
-                <a:ea typeface="Josefin Sans"/>
-                <a:cs typeface="Josefin Sans"/>
-                <a:sym typeface="Josefin Sans"/>
-              </a:rPr>
-              <a:t>PROTO-PERSONA</a:t>
-            </a:r>
-            <a:endParaRPr dirty="0">
-              <a:latin typeface="Josefin Sans"/>
-              <a:ea typeface="Josefin Sans"/>
-              <a:cs typeface="Josefin Sans"/>
-              <a:sym typeface="Josefin Sans"/>
-            </a:endParaRPr>
-          </a:p>
-        </p:txBody>
-      </p:sp>
-      <p:cxnSp>
-        <p:nvCxnSpPr>
-          <p:cNvPr id="327" name="Google Shape;327;p20"/>
-          <p:cNvCxnSpPr/>
-          <p:nvPr/>
-        </p:nvCxnSpPr>
-        <p:spPr>
-          <a:xfrm>
-            <a:off x="841434" y="2762125"/>
-            <a:ext cx="373800" cy="0"/>
-          </a:xfrm>
-          <a:prstGeom prst="straightConnector1">
-            <a:avLst/>
-          </a:prstGeom>
-          <a:noFill/>
-          <a:ln w="19050" cap="flat" cmpd="sng">
-            <a:solidFill>
-              <a:srgbClr val="F3F3F3"/>
-            </a:solidFill>
-            <a:prstDash val="solid"/>
-            <a:round/>
-            <a:headEnd type="none" w="med" len="med"/>
-            <a:tailEnd type="none" w="med" len="med"/>
-          </a:ln>
-        </p:spPr>
-      </p:cxnSp>
-      <p:pic>
-        <p:nvPicPr>
-          <p:cNvPr id="14" name="Imagem 13">
-            <a:extLst>
-              <a:ext uri="{FF2B5EF4-FFF2-40B4-BE49-F238E27FC236}">
-                <a16:creationId xmlns:a16="http://schemas.microsoft.com/office/drawing/2014/main" id="{A1546BA2-A746-4D78-BA2A-66EACE53308E}"/>
-              </a:ext>
-            </a:extLst>
-          </p:cNvPr>
-          <p:cNvPicPr>
-            <a:picLocks noChangeAspect="1"/>
-          </p:cNvPicPr>
-          <p:nvPr/>
-        </p:nvPicPr>
-        <p:blipFill>
-          <a:blip r:embed="rId3">
-            <a:extLst>
-              <a:ext uri="{28A0092B-C50C-407E-A947-70E740481C1C}">
-                <a14:useLocalDpi xmlns:a14="http://schemas.microsoft.com/office/drawing/2010/main" val="0"/>
-              </a:ext>
-            </a:extLst>
-          </a:blip>
-          <a:stretch>
-            <a:fillRect/>
-          </a:stretch>
-        </p:blipFill>
-        <p:spPr>
-          <a:xfrm>
-            <a:off x="6411514" y="1407885"/>
-            <a:ext cx="2133920" cy="2133920"/>
-          </a:xfrm>
-          <a:prstGeom prst="rect">
-            <a:avLst/>
-          </a:prstGeom>
-        </p:spPr>
-      </p:pic>
-      <p:sp>
-        <p:nvSpPr>
-          <p:cNvPr id="7" name="Google Shape;326;p20"/>
-          <p:cNvSpPr txBox="1">
-            <a:spLocks noGrp="1"/>
-          </p:cNvSpPr>
-          <p:nvPr>
-            <p:ph type="subTitle" idx="1"/>
-          </p:nvPr>
-        </p:nvSpPr>
-        <p:spPr>
-          <a:xfrm>
-            <a:off x="720000" y="2837638"/>
-            <a:ext cx="4448400" cy="1044600"/>
-          </a:xfrm>
-          <a:prstGeom prst="rect">
-            <a:avLst/>
-          </a:prstGeom>
-        </p:spPr>
-        <p:txBody>
-          <a:bodyPr spcFirstLastPara="1" wrap="square" lIns="91425" tIns="91425" rIns="91425" bIns="91425" anchor="t" anchorCtr="0">
-            <a:noAutofit/>
-          </a:bodyPr>
-          <a:lstStyle/>
-          <a:p>
-            <a:pPr marL="0" lvl="0" indent="0" algn="l" rtl="0">
-              <a:spcBef>
-                <a:spcPts val="0"/>
-              </a:spcBef>
-              <a:spcAft>
-                <a:spcPts val="0"/>
-              </a:spcAft>
-              <a:buNone/>
-            </a:pPr>
-            <a:r>
-              <a:rPr lang="pt-BR" dirty="0">
-                <a:solidFill>
-                  <a:srgbClr val="92D050"/>
-                </a:solidFill>
-              </a:rPr>
-              <a:t>Gerente de Loja</a:t>
-            </a:r>
-          </a:p>
-        </p:txBody>
-      </p:sp>
-    </p:spTree>
-    <p:extLst>
-      <p:ext uri="{BB962C8B-B14F-4D97-AF65-F5344CB8AC3E}">
-        <p14:creationId xmlns:p14="http://schemas.microsoft.com/office/powerpoint/2010/main" val="3768014537"/>
-      </p:ext>
-    </p:extLst>
-  </p:cSld>
-  <p:clrMapOvr>
-    <a:masterClrMapping/>
-  </p:clrMapOvr>
-  <mc:AlternateContent xmlns:mc="http://schemas.openxmlformats.org/markup-compatibility/2006" xmlns:p14="http://schemas.microsoft.com/office/powerpoint/2010/main">
-    <mc:Choice Requires="p14">
-      <p:transition spd="med" p14:dur="700">
-        <p:fade/>
-      </p:transition>
-    </mc:Choice>
-    <mc:Fallback xmlns="">
-      <p:transition spd="med">
-        <p:fade/>
-      </p:transition>
-    </mc:Fallback>
-  </mc:AlternateContent>
-</p:sld>
-</file>
-
-<file path=ppt/slides/slide21.xml><?xml version="1.0" encoding="utf-8"?>
+<file path=ppt/slides/slide16.xml><?xml version="1.0" encoding="utf-8"?>
 <p:sld xmlns:a="http://schemas.openxmlformats.org/drawingml/2006/main" xmlns:r="http://schemas.openxmlformats.org/officeDocument/2006/relationships" xmlns:p="http://schemas.openxmlformats.org/presentationml/2006/main">
   <p:cSld>
     <p:bg>
@@ -25064,7 +22228,7 @@
 </p:sld>
 </file>
 
-<file path=ppt/slides/slide22.xml><?xml version="1.0" encoding="utf-8"?>
+<file path=ppt/slides/slide17.xml><?xml version="1.0" encoding="utf-8"?>
 <p:sld xmlns:a="http://schemas.openxmlformats.org/drawingml/2006/main" xmlns:r="http://schemas.openxmlformats.org/officeDocument/2006/relationships" xmlns:p="http://schemas.openxmlformats.org/presentationml/2006/main">
   <p:cSld>
     <p:bg>
@@ -25361,7 +22525,7 @@
 </p:sld>
 </file>
 
-<file path=ppt/slides/slide23.xml><?xml version="1.0" encoding="utf-8"?>
+<file path=ppt/slides/slide18.xml><?xml version="1.0" encoding="utf-8"?>
 <p:sld xmlns:a="http://schemas.openxmlformats.org/drawingml/2006/main" xmlns:r="http://schemas.openxmlformats.org/officeDocument/2006/relationships" xmlns:p="http://schemas.openxmlformats.org/presentationml/2006/main">
   <p:cSld>
     <p:bg>
@@ -25658,7 +22822,7 @@
 </p:sld>
 </file>
 
-<file path=ppt/slides/slide24.xml><?xml version="1.0" encoding="utf-8"?>
+<file path=ppt/slides/slide19.xml><?xml version="1.0" encoding="utf-8"?>
 <p:sld xmlns:a="http://schemas.openxmlformats.org/drawingml/2006/main" xmlns:r="http://schemas.openxmlformats.org/officeDocument/2006/relationships" xmlns:p="http://schemas.openxmlformats.org/presentationml/2006/main">
   <p:cSld>
     <p:bg>
@@ -25959,7 +23123,400 @@
 </p:sld>
 </file>
 
-<file path=ppt/slides/slide25.xml><?xml version="1.0" encoding="utf-8"?>
+<file path=ppt/slides/slide2.xml><?xml version="1.0" encoding="utf-8"?>
+<p:sld xmlns:a="http://schemas.openxmlformats.org/drawingml/2006/main" xmlns:r="http://schemas.openxmlformats.org/officeDocument/2006/relationships" xmlns:p="http://schemas.openxmlformats.org/presentationml/2006/main">
+  <p:cSld>
+    <p:bg>
+      <p:bgPr>
+        <a:solidFill>
+          <a:srgbClr val="1F1F1F"/>
+        </a:solidFill>
+        <a:effectLst/>
+      </p:bgPr>
+    </p:bg>
+    <p:spTree>
+      <p:nvGrpSpPr>
+        <p:cNvPr id="1" name="Shape 438"/>
+        <p:cNvGrpSpPr/>
+        <p:nvPr/>
+      </p:nvGrpSpPr>
+      <p:grpSpPr>
+        <a:xfrm>
+          <a:off x="0" y="0"/>
+          <a:ext cx="0" cy="0"/>
+          <a:chOff x="0" y="0"/>
+          <a:chExt cx="0" cy="0"/>
+        </a:xfrm>
+      </p:grpSpPr>
+      <p:cxnSp>
+        <p:nvCxnSpPr>
+          <p:cNvPr id="442" name="Google Shape;442;p27"/>
+          <p:cNvCxnSpPr/>
+          <p:nvPr/>
+        </p:nvCxnSpPr>
+        <p:spPr>
+          <a:xfrm>
+            <a:off x="1844542" y="1370756"/>
+            <a:ext cx="373800" cy="0"/>
+          </a:xfrm>
+          <a:prstGeom prst="straightConnector1">
+            <a:avLst/>
+          </a:prstGeom>
+          <a:noFill/>
+          <a:ln w="19050" cap="flat" cmpd="sng">
+            <a:solidFill>
+              <a:srgbClr val="F3F3F3"/>
+            </a:solidFill>
+            <a:prstDash val="solid"/>
+            <a:round/>
+            <a:headEnd type="none" w="med" len="med"/>
+            <a:tailEnd type="none" w="med" len="med"/>
+          </a:ln>
+        </p:spPr>
+      </p:cxnSp>
+      <p:cxnSp>
+        <p:nvCxnSpPr>
+          <p:cNvPr id="443" name="Google Shape;443;p27"/>
+          <p:cNvCxnSpPr/>
+          <p:nvPr/>
+        </p:nvCxnSpPr>
+        <p:spPr>
+          <a:xfrm>
+            <a:off x="6434861" y="1402174"/>
+            <a:ext cx="373800" cy="0"/>
+          </a:xfrm>
+          <a:prstGeom prst="straightConnector1">
+            <a:avLst/>
+          </a:prstGeom>
+          <a:noFill/>
+          <a:ln w="19050" cap="flat" cmpd="sng">
+            <a:solidFill>
+              <a:srgbClr val="F3F3F3"/>
+            </a:solidFill>
+            <a:prstDash val="solid"/>
+            <a:round/>
+            <a:headEnd type="none" w="med" len="med"/>
+            <a:tailEnd type="none" w="med" len="med"/>
+          </a:ln>
+        </p:spPr>
+      </p:cxnSp>
+      <p:sp>
+        <p:nvSpPr>
+          <p:cNvPr id="444" name="Google Shape;444;p27"/>
+          <p:cNvSpPr txBox="1">
+            <a:spLocks noGrp="1"/>
+          </p:cNvSpPr>
+          <p:nvPr>
+            <p:ph type="subTitle" idx="1"/>
+          </p:nvPr>
+        </p:nvSpPr>
+        <p:spPr>
+          <a:xfrm>
+            <a:off x="230657" y="712348"/>
+            <a:ext cx="3556800" cy="538371"/>
+          </a:xfrm>
+          <a:prstGeom prst="rect">
+            <a:avLst/>
+          </a:prstGeom>
+        </p:spPr>
+        <p:txBody>
+          <a:bodyPr spcFirstLastPara="1" wrap="square" lIns="91425" tIns="91425" rIns="91425" bIns="91425" anchor="ctr" anchorCtr="0">
+            <a:noAutofit/>
+          </a:bodyPr>
+          <a:lstStyle/>
+          <a:p>
+            <a:pPr marL="0" lvl="0" indent="0" algn="ctr" rtl="0">
+              <a:spcBef>
+                <a:spcPts val="0"/>
+              </a:spcBef>
+              <a:spcAft>
+                <a:spcPts val="1600"/>
+              </a:spcAft>
+              <a:buNone/>
+            </a:pPr>
+            <a:r>
+              <a:rPr lang="en" dirty="0">
+                <a:solidFill>
+                  <a:srgbClr val="00B0F0"/>
+                </a:solidFill>
+              </a:rPr>
+              <a:t>Henrique Carlos</a:t>
+            </a:r>
+            <a:endParaRPr dirty="0">
+              <a:solidFill>
+                <a:srgbClr val="00B0F0"/>
+              </a:solidFill>
+            </a:endParaRPr>
+          </a:p>
+        </p:txBody>
+      </p:sp>
+      <p:sp>
+        <p:nvSpPr>
+          <p:cNvPr id="445" name="Google Shape;445;p27"/>
+          <p:cNvSpPr txBox="1">
+            <a:spLocks noGrp="1"/>
+          </p:cNvSpPr>
+          <p:nvPr>
+            <p:ph type="subTitle" idx="2"/>
+          </p:nvPr>
+        </p:nvSpPr>
+        <p:spPr>
+          <a:xfrm>
+            <a:off x="4843361" y="743449"/>
+            <a:ext cx="3556800" cy="538371"/>
+          </a:xfrm>
+          <a:prstGeom prst="rect">
+            <a:avLst/>
+          </a:prstGeom>
+        </p:spPr>
+        <p:txBody>
+          <a:bodyPr spcFirstLastPara="1" wrap="square" lIns="91425" tIns="91425" rIns="91425" bIns="91425" anchor="ctr" anchorCtr="0">
+            <a:noAutofit/>
+          </a:bodyPr>
+          <a:lstStyle/>
+          <a:p>
+            <a:pPr marL="0" lvl="0" indent="0" algn="ctr" rtl="0">
+              <a:spcBef>
+                <a:spcPts val="0"/>
+              </a:spcBef>
+              <a:spcAft>
+                <a:spcPts val="1600"/>
+              </a:spcAft>
+              <a:buNone/>
+            </a:pPr>
+            <a:r>
+              <a:rPr lang="en" dirty="0">
+                <a:solidFill>
+                  <a:srgbClr val="00B0F0"/>
+                </a:solidFill>
+              </a:rPr>
+              <a:t>Maycon Maia</a:t>
+            </a:r>
+            <a:endParaRPr dirty="0">
+              <a:solidFill>
+                <a:srgbClr val="00B0F0"/>
+              </a:solidFill>
+            </a:endParaRPr>
+          </a:p>
+        </p:txBody>
+      </p:sp>
+      <p:sp>
+        <p:nvSpPr>
+          <p:cNvPr id="446" name="Google Shape;446;p27"/>
+          <p:cNvSpPr txBox="1">
+            <a:spLocks noGrp="1"/>
+          </p:cNvSpPr>
+          <p:nvPr>
+            <p:ph type="subTitle" idx="3"/>
+          </p:nvPr>
+        </p:nvSpPr>
+        <p:spPr>
+          <a:xfrm>
+            <a:off x="661529" y="1370756"/>
+            <a:ext cx="2871836" cy="788100"/>
+          </a:xfrm>
+          <a:prstGeom prst="rect">
+            <a:avLst/>
+          </a:prstGeom>
+        </p:spPr>
+        <p:txBody>
+          <a:bodyPr spcFirstLastPara="1" wrap="square" lIns="91425" tIns="91425" rIns="91425" bIns="91425" anchor="t" anchorCtr="0">
+            <a:noAutofit/>
+          </a:bodyPr>
+          <a:lstStyle/>
+          <a:p>
+            <a:pPr marL="0" lvl="0" indent="0" algn="ctr" rtl="0">
+              <a:spcBef>
+                <a:spcPts val="0"/>
+              </a:spcBef>
+              <a:spcAft>
+                <a:spcPts val="1600"/>
+              </a:spcAft>
+              <a:buNone/>
+            </a:pPr>
+            <a:r>
+              <a:rPr lang="en" dirty="0">
+                <a:solidFill>
+                  <a:srgbClr val="92D050"/>
+                </a:solidFill>
+              </a:rPr>
+              <a:t>Web Designer</a:t>
+            </a:r>
+            <a:endParaRPr dirty="0">
+              <a:solidFill>
+                <a:srgbClr val="92D050"/>
+              </a:solidFill>
+            </a:endParaRPr>
+          </a:p>
+        </p:txBody>
+      </p:sp>
+      <p:sp>
+        <p:nvSpPr>
+          <p:cNvPr id="447" name="Google Shape;447;p27"/>
+          <p:cNvSpPr txBox="1">
+            <a:spLocks noGrp="1"/>
+          </p:cNvSpPr>
+          <p:nvPr>
+            <p:ph type="subTitle" idx="4"/>
+          </p:nvPr>
+        </p:nvSpPr>
+        <p:spPr>
+          <a:xfrm>
+            <a:off x="4484915" y="1402174"/>
+            <a:ext cx="4659056" cy="788100"/>
+          </a:xfrm>
+          <a:prstGeom prst="rect">
+            <a:avLst/>
+          </a:prstGeom>
+        </p:spPr>
+        <p:txBody>
+          <a:bodyPr spcFirstLastPara="1" wrap="square" lIns="91425" tIns="91425" rIns="91425" bIns="91425" anchor="t" anchorCtr="0">
+            <a:noAutofit/>
+          </a:bodyPr>
+          <a:lstStyle/>
+          <a:p>
+            <a:pPr marL="0" lvl="0" indent="0" algn="ctr" rtl="0">
+              <a:spcBef>
+                <a:spcPts val="0"/>
+              </a:spcBef>
+              <a:spcAft>
+                <a:spcPts val="1600"/>
+              </a:spcAft>
+              <a:buNone/>
+            </a:pPr>
+            <a:r>
+              <a:rPr lang="en" sz="2800" dirty="0">
+                <a:solidFill>
+                  <a:srgbClr val="92D050"/>
+                </a:solidFill>
+              </a:rPr>
+              <a:t>Analista de Banco de Dados</a:t>
+            </a:r>
+            <a:endParaRPr sz="2800" dirty="0">
+              <a:solidFill>
+                <a:srgbClr val="92D050"/>
+              </a:solidFill>
+            </a:endParaRPr>
+          </a:p>
+        </p:txBody>
+      </p:sp>
+      <p:pic>
+        <p:nvPicPr>
+          <p:cNvPr id="4" name="Imagem 3"/>
+          <p:cNvPicPr>
+            <a:picLocks noChangeAspect="1"/>
+          </p:cNvPicPr>
+          <p:nvPr/>
+        </p:nvPicPr>
+        <p:blipFill>
+          <a:blip r:embed="rId3">
+            <a:extLst>
+              <a:ext uri="{28A0092B-C50C-407E-A947-70E740481C1C}">
+                <a14:useLocalDpi xmlns:a14="http://schemas.microsoft.com/office/drawing/2010/main" val="0"/>
+              </a:ext>
+            </a:extLst>
+          </a:blip>
+          <a:stretch>
+            <a:fillRect/>
+          </a:stretch>
+        </p:blipFill>
+        <p:spPr>
+          <a:xfrm>
+            <a:off x="767152" y="2041739"/>
+            <a:ext cx="2483809" cy="3101761"/>
+          </a:xfrm>
+          <a:prstGeom prst="rect">
+            <a:avLst/>
+          </a:prstGeom>
+        </p:spPr>
+      </p:pic>
+      <p:pic>
+        <p:nvPicPr>
+          <p:cNvPr id="5" name="Imagem 4"/>
+          <p:cNvPicPr>
+            <a:picLocks noChangeAspect="1"/>
+          </p:cNvPicPr>
+          <p:nvPr/>
+        </p:nvPicPr>
+        <p:blipFill>
+          <a:blip r:embed="rId4">
+            <a:extLst>
+              <a:ext uri="{28A0092B-C50C-407E-A947-70E740481C1C}">
+                <a14:useLocalDpi xmlns:a14="http://schemas.microsoft.com/office/drawing/2010/main" val="0"/>
+              </a:ext>
+            </a:extLst>
+          </a:blip>
+          <a:stretch>
+            <a:fillRect/>
+          </a:stretch>
+        </p:blipFill>
+        <p:spPr>
+          <a:xfrm>
+            <a:off x="5277931" y="2041738"/>
+            <a:ext cx="3061459" cy="3101762"/>
+          </a:xfrm>
+          <a:prstGeom prst="rect">
+            <a:avLst/>
+          </a:prstGeom>
+        </p:spPr>
+      </p:pic>
+      <p:pic>
+        <p:nvPicPr>
+          <p:cNvPr id="22" name="Imagem 21">
+            <a:extLst>
+              <a:ext uri="{FF2B5EF4-FFF2-40B4-BE49-F238E27FC236}">
+                <a16:creationId xmlns:a16="http://schemas.microsoft.com/office/drawing/2014/main" id="{A1546BA2-A746-4D78-BA2A-66EACE53308E}"/>
+              </a:ext>
+            </a:extLst>
+          </p:cNvPr>
+          <p:cNvPicPr>
+            <a:picLocks noChangeAspect="1"/>
+          </p:cNvPicPr>
+          <p:nvPr/>
+        </p:nvPicPr>
+        <p:blipFill>
+          <a:blip r:embed="rId5">
+            <a:extLst>
+              <a:ext uri="{28A0092B-C50C-407E-A947-70E740481C1C}">
+                <a14:useLocalDpi xmlns:a14="http://schemas.microsoft.com/office/drawing/2010/main" val="0"/>
+              </a:ext>
+            </a:extLst>
+          </a:blip>
+          <a:stretch>
+            <a:fillRect/>
+          </a:stretch>
+        </p:blipFill>
+        <p:spPr>
+          <a:xfrm>
+            <a:off x="196483" y="175701"/>
+            <a:ext cx="533852" cy="533852"/>
+          </a:xfrm>
+          <a:prstGeom prst="rect">
+            <a:avLst/>
+          </a:prstGeom>
+        </p:spPr>
+      </p:pic>
+    </p:spTree>
+  </p:cSld>
+  <p:clrMapOvr>
+    <a:masterClrMapping/>
+  </p:clrMapOvr>
+  <mc:AlternateContent xmlns:mc="http://schemas.openxmlformats.org/markup-compatibility/2006" xmlns:p14="http://schemas.microsoft.com/office/powerpoint/2010/main">
+    <mc:Choice Requires="p14">
+      <p:transition spd="med" p14:dur="700">
+        <p:fade/>
+      </p:transition>
+    </mc:Choice>
+    <mc:Fallback xmlns="">
+      <p:transition spd="med">
+        <p:fade/>
+      </p:transition>
+    </mc:Fallback>
+  </mc:AlternateContent>
+</p:sld>
+</file>
+
+<file path=ppt/slides/slide20.xml><?xml version="1.0" encoding="utf-8"?>
 <p:sld xmlns:a="http://schemas.openxmlformats.org/drawingml/2006/main" xmlns:r="http://schemas.openxmlformats.org/officeDocument/2006/relationships" xmlns:p="http://schemas.openxmlformats.org/presentationml/2006/main">
   <p:cSld>
     <p:bg>
@@ -26172,7 +23729,7 @@
 </p:sld>
 </file>
 
-<file path=ppt/slides/slide26.xml><?xml version="1.0" encoding="utf-8"?>
+<file path=ppt/slides/slide21.xml><?xml version="1.0" encoding="utf-8"?>
 <p:sld xmlns:a="http://schemas.openxmlformats.org/drawingml/2006/main" xmlns:r="http://schemas.openxmlformats.org/officeDocument/2006/relationships" xmlns:p="http://schemas.openxmlformats.org/presentationml/2006/main">
   <p:cSld>
     <p:bg>
@@ -26464,7 +24021,7 @@
 </p:sld>
 </file>
 
-<file path=ppt/slides/slide27.xml><?xml version="1.0" encoding="utf-8"?>
+<file path=ppt/slides/slide22.xml><?xml version="1.0" encoding="utf-8"?>
 <p:sld xmlns:a="http://schemas.openxmlformats.org/drawingml/2006/main" xmlns:r="http://schemas.openxmlformats.org/officeDocument/2006/relationships" xmlns:p="http://schemas.openxmlformats.org/presentationml/2006/main">
   <p:cSld>
     <p:bg>

</xml_diff>

<commit_message>
Arrumando detalhes ortográficos no canvas
</commit_message>
<xml_diff>
--- a/Documentacao/Slides KPRunnin.pptx
+++ b/Documentacao/Slides KPRunnin.pptx
@@ -59,14 +59,14 @@
       <p:regular r:id="rId33"/>
     </p:embeddedFont>
     <p:embeddedFont>
-      <p:font typeface="Roboto Light" pitchFamily="2" charset="0"/>
+      <p:font typeface="Roboto Light" panose="020B0604020202020204" charset="0"/>
       <p:regular r:id="rId34"/>
       <p:bold r:id="rId35"/>
       <p:italic r:id="rId36"/>
       <p:boldItalic r:id="rId37"/>
     </p:embeddedFont>
     <p:embeddedFont>
-      <p:font typeface="Roboto Thin" pitchFamily="2" charset="0"/>
+      <p:font typeface="Roboto Thin" panose="020B0604020202020204" charset="0"/>
       <p:regular r:id="rId38"/>
       <p:bold r:id="rId39"/>
       <p:italic r:id="rId40"/>
@@ -18851,7 +18851,7 @@
             </a:pPr>
             <a:r>
               <a:rPr lang="en" sz="4800" dirty="0"/>
-              <a:t>LEAN CANVAS UX</a:t>
+              <a:t>CANVAS</a:t>
             </a:r>
             <a:endParaRPr sz="4800" dirty="0">
               <a:sym typeface="Josefin Sans"/>
@@ -19106,28 +19106,28 @@
       </p:sp>
       <p:pic>
         <p:nvPicPr>
-          <p:cNvPr id="2" name="Imagem 1"/>
+          <p:cNvPr id="4" name="Imagem 3" descr="Uma imagem contendo texto, screenshot&#10;&#10;Descrição gerada automaticamente">
+            <a:extLst>
+              <a:ext uri="{FF2B5EF4-FFF2-40B4-BE49-F238E27FC236}">
+                <a16:creationId xmlns:a16="http://schemas.microsoft.com/office/drawing/2014/main" id="{42C08ACB-2F79-4971-9BD9-6E1160019F80}"/>
+              </a:ext>
+            </a:extLst>
+          </p:cNvPr>
           <p:cNvPicPr>
             <a:picLocks noChangeAspect="1"/>
           </p:cNvPicPr>
           <p:nvPr/>
         </p:nvPicPr>
         <p:blipFill>
-          <a:blip r:embed="rId3">
-            <a:extLst>
-              <a:ext uri="{28A0092B-C50C-407E-A947-70E740481C1C}">
-                <a14:useLocalDpi xmlns:a14="http://schemas.microsoft.com/office/drawing/2010/main" val="0"/>
-              </a:ext>
-            </a:extLst>
-          </a:blip>
+          <a:blip r:embed="rId3"/>
           <a:stretch>
             <a:fillRect/>
           </a:stretch>
         </p:blipFill>
         <p:spPr>
           <a:xfrm>
-            <a:off x="0" y="-1"/>
-            <a:ext cx="9144000" cy="5143505"/>
+            <a:off x="0" y="0"/>
+            <a:ext cx="9144000" cy="5143499"/>
           </a:xfrm>
           <a:prstGeom prst="rect">
             <a:avLst/>

</xml_diff>